<commit_message>
use publish on fit1p
d1 and d2 take the value 10^-4, 10^-2 and 1
</commit_message>
<xml_diff>
--- a/Results/Variation_d1-d2/html/results.pptx
+++ b/Results/Variation_d1-d2/html/results.pptx
@@ -6,6 +6,21 @@
   </p:sldMasterIdLst>
   <p:sldIdLst>
     <p:sldId id="256" r:id="rId2"/>
+    <p:sldId id="257" r:id="rId7"/>
+    <p:sldId id="258" r:id="rId8"/>
+    <p:sldId id="259" r:id="rId9"/>
+    <p:sldId id="260" r:id="rId10"/>
+    <p:sldId id="261" r:id="rId11"/>
+    <p:sldId id="262" r:id="rId12"/>
+    <p:sldId id="263" r:id="rId13"/>
+    <p:sldId id="264" r:id="rId14"/>
+    <p:sldId id="265" r:id="rId15"/>
+    <p:sldId id="266" r:id="rId16"/>
+    <p:sldId id="267" r:id="rId17"/>
+    <p:sldId id="268" r:id="rId18"/>
+    <p:sldId id="269" r:id="rId19"/>
+    <p:sldId id="270" r:id="rId20"/>
+    <p:sldId id="271" r:id="rId21"/>
   </p:sldIdLst>
   <p:sldSz cx="12192000" cy="6858000"/>
   <p:notesSz cx="6858000" cy="9144000"/>
@@ -104,6 +119,11 @@
       </a:defRPr>
     </a:lvl9pPr>
   </p:defaultTextStyle>
+  <p:extLst>
+    <p:ext uri="{EFAFB233-063F-42B5-8137-9DF3F51BA10A}">
+      <p15:sldGuideLst xmlns:p15="http://schemas.microsoft.com/office/powerpoint/2012/main"/>
+    </p:ext>
+  </p:extLst>
 </p:presentation>
 </file>
 
@@ -3342,12 +3362,2298 @@
           <a:chExt cx="0" cy="0"/>
         </a:xfrm>
       </p:grpSpPr>
+      <p:pic>
+        <p:nvPicPr>
+          <p:cNvPr id="2" name="Picture 1" descr="modify_d1_d2_02.png"/>
+          <p:cNvPicPr>
+            <a:picLocks noChangeAspect="1"/>
+          </p:cNvPicPr>
+          <p:nvPr/>
+        </p:nvPicPr>
+        <p:blipFill>
+          <a:blip r:embed="rId2"/>
+          <a:stretch>
+            <a:fillRect/>
+          </a:stretch>
+        </p:blipFill>
+        <p:spPr>
+          <a:xfrm>
+            <a:off x="402336" y="457200"/>
+            <a:ext cx="5486400" cy="3200400"/>
+          </a:xfrm>
+          <a:prstGeom prst="rect">
+            <a:avLst/>
+          </a:prstGeom>
+        </p:spPr>
+      </p:pic>
+      <p:pic>
+        <p:nvPicPr>
+          <p:cNvPr id="3" name="Picture 2" descr="modify_d1_d2_01.png"/>
+          <p:cNvPicPr>
+            <a:picLocks noChangeAspect="1"/>
+          </p:cNvPicPr>
+          <p:nvPr/>
+        </p:nvPicPr>
+        <p:blipFill>
+          <a:blip r:embed="rId3"/>
+          <a:stretch>
+            <a:fillRect/>
+          </a:stretch>
+        </p:blipFill>
+        <p:spPr>
+          <a:xfrm>
+            <a:off x="402336" y="3657600"/>
+            <a:ext cx="5486400" cy="3200400"/>
+          </a:xfrm>
+          <a:prstGeom prst="rect">
+            <a:avLst/>
+          </a:prstGeom>
+        </p:spPr>
+      </p:pic>
+      <p:pic>
+        <p:nvPicPr>
+          <p:cNvPr id="4" name="Picture 3" descr="modify_d1_d2_06.png"/>
+          <p:cNvPicPr>
+            <a:picLocks noChangeAspect="1"/>
+          </p:cNvPicPr>
+          <p:nvPr/>
+        </p:nvPicPr>
+        <p:blipFill>
+          <a:blip r:embed="rId4"/>
+          <a:stretch>
+            <a:fillRect/>
+          </a:stretch>
+        </p:blipFill>
+        <p:spPr>
+          <a:xfrm>
+            <a:off x="6300216" y="457200"/>
+            <a:ext cx="5486400" cy="3200400"/>
+          </a:xfrm>
+          <a:prstGeom prst="rect">
+            <a:avLst/>
+          </a:prstGeom>
+        </p:spPr>
+      </p:pic>
+      <p:pic>
+        <p:nvPicPr>
+          <p:cNvPr id="5" name="Picture 4" descr="modify_d1_d2_05.png"/>
+          <p:cNvPicPr>
+            <a:picLocks noChangeAspect="1"/>
+          </p:cNvPicPr>
+          <p:nvPr/>
+        </p:nvPicPr>
+        <p:blipFill>
+          <a:blip r:embed="rId5"/>
+          <a:stretch>
+            <a:fillRect/>
+          </a:stretch>
+        </p:blipFill>
+        <p:spPr>
+          <a:xfrm>
+            <a:off x="6300216" y="3657600"/>
+            <a:ext cx="5486400" cy="3200400"/>
+          </a:xfrm>
+          <a:prstGeom prst="rect">
+            <a:avLst/>
+          </a:prstGeom>
+        </p:spPr>
+      </p:pic>
+      <p:sp>
+        <p:nvSpPr>
+          <p:cNvPr id="6" name="TextBox 5"/>
+          <p:cNvSpPr txBox="1"/>
+          <p:nvPr/>
+        </p:nvSpPr>
+        <p:spPr>
+          <a:xfrm>
+            <a:off x="0" y="0"/>
+            <a:ext cx="12188952" cy="457200"/>
+          </a:xfrm>
+          <a:prstGeom prst="rect">
+            <a:avLst/>
+          </a:prstGeom>
+          <a:noFill/>
+        </p:spPr>
+        <p:txBody>
+          <a:bodyPr wrap="none">
+            <a:spAutoFit/>
+          </a:bodyPr>
+          <a:lstStyle/>
+          <a:p>
+            <a:pPr algn="ctr"/>
+            <a:r>
+              <a:rPr sz="2400" b="1"/>
+              <a:t>fit1p.mps</a:t>
+            </a:r>
+          </a:p>
+        </p:txBody>
+      </p:sp>
     </p:spTree>
     <p:extLst>
       <p:ext uri="{BB962C8B-B14F-4D97-AF65-F5344CB8AC3E}">
-        <p14:creationId xmlns:p14="http://schemas.microsoft.com/office/powerpoint/2010/main" val="2662311176"/>
+        <p14:creationId xmlns:p14="http://schemas.microsoft.com/office/powerpoint/2010/main" val="132759147"/>
       </p:ext>
     </p:extLst>
+  </p:cSld>
+  <p:clrMapOvr>
+    <a:masterClrMapping/>
+  </p:clrMapOvr>
+</p:sld>
+</file>
+
+<file path=ppt/slides/slide10.xml><?xml version="1.0" encoding="utf-8"?>
+<p:sld xmlns:a="http://schemas.openxmlformats.org/drawingml/2006/main" xmlns:p="http://schemas.openxmlformats.org/presentationml/2006/main" xmlns:r="http://schemas.openxmlformats.org/officeDocument/2006/relationships">
+  <p:cSld>
+    <p:spTree>
+      <p:nvGrpSpPr>
+        <p:cNvPr id="1" name=""/>
+        <p:cNvGrpSpPr/>
+        <p:nvPr/>
+      </p:nvGrpSpPr>
+      <p:grpSpPr/>
+      <p:pic>
+        <p:nvPicPr>
+          <p:cNvPr id="2" name="Picture 1" descr="modify_d1_d2_03.png"/>
+          <p:cNvPicPr>
+            <a:picLocks noChangeAspect="1"/>
+          </p:cNvPicPr>
+          <p:nvPr/>
+        </p:nvPicPr>
+        <p:blipFill>
+          <a:blip r:embed="rId2"/>
+          <a:stretch>
+            <a:fillRect/>
+          </a:stretch>
+        </p:blipFill>
+        <p:spPr>
+          <a:xfrm>
+            <a:off x="402336" y="457200"/>
+            <a:ext cx="5486400" cy="3200400"/>
+          </a:xfrm>
+          <a:prstGeom prst="rect">
+            <a:avLst/>
+          </a:prstGeom>
+        </p:spPr>
+      </p:pic>
+      <p:pic>
+        <p:nvPicPr>
+          <p:cNvPr id="3" name="Picture 2" descr="modify_d1_d2_04.png"/>
+          <p:cNvPicPr>
+            <a:picLocks noChangeAspect="1"/>
+          </p:cNvPicPr>
+          <p:nvPr/>
+        </p:nvPicPr>
+        <p:blipFill>
+          <a:blip r:embed="rId3"/>
+          <a:stretch>
+            <a:fillRect/>
+          </a:stretch>
+        </p:blipFill>
+        <p:spPr>
+          <a:xfrm>
+            <a:off x="402336" y="3657600"/>
+            <a:ext cx="5486400" cy="3200400"/>
+          </a:xfrm>
+          <a:prstGeom prst="rect">
+            <a:avLst/>
+          </a:prstGeom>
+        </p:spPr>
+      </p:pic>
+      <p:pic>
+        <p:nvPicPr>
+          <p:cNvPr id="4" name="Picture 3" descr="modify_d1_d2_23.png"/>
+          <p:cNvPicPr>
+            <a:picLocks noChangeAspect="1"/>
+          </p:cNvPicPr>
+          <p:nvPr/>
+        </p:nvPicPr>
+        <p:blipFill>
+          <a:blip r:embed="rId4"/>
+          <a:stretch>
+            <a:fillRect/>
+          </a:stretch>
+        </p:blipFill>
+        <p:spPr>
+          <a:xfrm>
+            <a:off x="6300216" y="457200"/>
+            <a:ext cx="5486400" cy="3200400"/>
+          </a:xfrm>
+          <a:prstGeom prst="rect">
+            <a:avLst/>
+          </a:prstGeom>
+        </p:spPr>
+      </p:pic>
+      <p:pic>
+        <p:nvPicPr>
+          <p:cNvPr id="5" name="Picture 4" descr="modify_d1_d2_24.png"/>
+          <p:cNvPicPr>
+            <a:picLocks noChangeAspect="1"/>
+          </p:cNvPicPr>
+          <p:nvPr/>
+        </p:nvPicPr>
+        <p:blipFill>
+          <a:blip r:embed="rId5"/>
+          <a:stretch>
+            <a:fillRect/>
+          </a:stretch>
+        </p:blipFill>
+        <p:spPr>
+          <a:xfrm>
+            <a:off x="6300216" y="3657600"/>
+            <a:ext cx="5486400" cy="3200400"/>
+          </a:xfrm>
+          <a:prstGeom prst="rect">
+            <a:avLst/>
+          </a:prstGeom>
+        </p:spPr>
+      </p:pic>
+      <p:sp>
+        <p:nvSpPr>
+          <p:cNvPr id="6" name="TextBox 5"/>
+          <p:cNvSpPr txBox="1"/>
+          <p:nvPr/>
+        </p:nvSpPr>
+        <p:spPr>
+          <a:xfrm>
+            <a:off x="0" y="0"/>
+            <a:ext cx="12188952" cy="457200"/>
+          </a:xfrm>
+          <a:prstGeom prst="rect">
+            <a:avLst/>
+          </a:prstGeom>
+          <a:noFill/>
+        </p:spPr>
+        <p:txBody>
+          <a:bodyPr wrap="none">
+            <a:spAutoFit/>
+          </a:bodyPr>
+          <a:lstStyle/>
+          <a:p>
+            <a:pPr algn="ctr"/>
+            <a:r>
+              <a:rPr sz="2400" b="1"/>
+              <a:t>fit1p.mps</a:t>
+            </a:r>
+          </a:p>
+        </p:txBody>
+      </p:sp>
+    </p:spTree>
+  </p:cSld>
+  <p:clrMapOvr>
+    <a:masterClrMapping/>
+  </p:clrMapOvr>
+</p:sld>
+</file>
+
+<file path=ppt/slides/slide11.xml><?xml version="1.0" encoding="utf-8"?>
+<p:sld xmlns:a="http://schemas.openxmlformats.org/drawingml/2006/main" xmlns:p="http://schemas.openxmlformats.org/presentationml/2006/main" xmlns:r="http://schemas.openxmlformats.org/officeDocument/2006/relationships">
+  <p:cSld>
+    <p:spTree>
+      <p:nvGrpSpPr>
+        <p:cNvPr id="1" name=""/>
+        <p:cNvGrpSpPr/>
+        <p:nvPr/>
+      </p:nvGrpSpPr>
+      <p:grpSpPr/>
+      <p:pic>
+        <p:nvPicPr>
+          <p:cNvPr id="2" name="Picture 1" descr="modify_d1_d2_02.png"/>
+          <p:cNvPicPr>
+            <a:picLocks noChangeAspect="1"/>
+          </p:cNvPicPr>
+          <p:nvPr/>
+        </p:nvPicPr>
+        <p:blipFill>
+          <a:blip r:embed="rId2"/>
+          <a:stretch>
+            <a:fillRect/>
+          </a:stretch>
+        </p:blipFill>
+        <p:spPr>
+          <a:xfrm>
+            <a:off x="402336" y="457200"/>
+            <a:ext cx="5486400" cy="3200400"/>
+          </a:xfrm>
+          <a:prstGeom prst="rect">
+            <a:avLst/>
+          </a:prstGeom>
+        </p:spPr>
+      </p:pic>
+      <p:pic>
+        <p:nvPicPr>
+          <p:cNvPr id="3" name="Picture 2" descr="modify_d1_d2_01.png"/>
+          <p:cNvPicPr>
+            <a:picLocks noChangeAspect="1"/>
+          </p:cNvPicPr>
+          <p:nvPr/>
+        </p:nvPicPr>
+        <p:blipFill>
+          <a:blip r:embed="rId3"/>
+          <a:stretch>
+            <a:fillRect/>
+          </a:stretch>
+        </p:blipFill>
+        <p:spPr>
+          <a:xfrm>
+            <a:off x="402336" y="3657600"/>
+            <a:ext cx="5486400" cy="3200400"/>
+          </a:xfrm>
+          <a:prstGeom prst="rect">
+            <a:avLst/>
+          </a:prstGeom>
+        </p:spPr>
+      </p:pic>
+      <p:pic>
+        <p:nvPicPr>
+          <p:cNvPr id="4" name="Picture 3" descr="modify_d1_d2_26.png"/>
+          <p:cNvPicPr>
+            <a:picLocks noChangeAspect="1"/>
+          </p:cNvPicPr>
+          <p:nvPr/>
+        </p:nvPicPr>
+        <p:blipFill>
+          <a:blip r:embed="rId4"/>
+          <a:stretch>
+            <a:fillRect/>
+          </a:stretch>
+        </p:blipFill>
+        <p:spPr>
+          <a:xfrm>
+            <a:off x="6300216" y="457200"/>
+            <a:ext cx="5486400" cy="3200400"/>
+          </a:xfrm>
+          <a:prstGeom prst="rect">
+            <a:avLst/>
+          </a:prstGeom>
+        </p:spPr>
+      </p:pic>
+      <p:pic>
+        <p:nvPicPr>
+          <p:cNvPr id="5" name="Picture 4" descr="modify_d1_d2_25.png"/>
+          <p:cNvPicPr>
+            <a:picLocks noChangeAspect="1"/>
+          </p:cNvPicPr>
+          <p:nvPr/>
+        </p:nvPicPr>
+        <p:blipFill>
+          <a:blip r:embed="rId5"/>
+          <a:stretch>
+            <a:fillRect/>
+          </a:stretch>
+        </p:blipFill>
+        <p:spPr>
+          <a:xfrm>
+            <a:off x="6300216" y="3657600"/>
+            <a:ext cx="5486400" cy="3200400"/>
+          </a:xfrm>
+          <a:prstGeom prst="rect">
+            <a:avLst/>
+          </a:prstGeom>
+        </p:spPr>
+      </p:pic>
+      <p:sp>
+        <p:nvSpPr>
+          <p:cNvPr id="6" name="TextBox 5"/>
+          <p:cNvSpPr txBox="1"/>
+          <p:nvPr/>
+        </p:nvSpPr>
+        <p:spPr>
+          <a:xfrm>
+            <a:off x="0" y="0"/>
+            <a:ext cx="12188952" cy="457200"/>
+          </a:xfrm>
+          <a:prstGeom prst="rect">
+            <a:avLst/>
+          </a:prstGeom>
+          <a:noFill/>
+        </p:spPr>
+        <p:txBody>
+          <a:bodyPr wrap="none">
+            <a:spAutoFit/>
+          </a:bodyPr>
+          <a:lstStyle/>
+          <a:p>
+            <a:pPr algn="ctr"/>
+            <a:r>
+              <a:rPr sz="2400" b="1"/>
+              <a:t>fit1p.mps</a:t>
+            </a:r>
+          </a:p>
+        </p:txBody>
+      </p:sp>
+    </p:spTree>
+  </p:cSld>
+  <p:clrMapOvr>
+    <a:masterClrMapping/>
+  </p:clrMapOvr>
+</p:sld>
+</file>
+
+<file path=ppt/slides/slide12.xml><?xml version="1.0" encoding="utf-8"?>
+<p:sld xmlns:a="http://schemas.openxmlformats.org/drawingml/2006/main" xmlns:p="http://schemas.openxmlformats.org/presentationml/2006/main" xmlns:r="http://schemas.openxmlformats.org/officeDocument/2006/relationships">
+  <p:cSld>
+    <p:spTree>
+      <p:nvGrpSpPr>
+        <p:cNvPr id="1" name=""/>
+        <p:cNvGrpSpPr/>
+        <p:nvPr/>
+      </p:nvGrpSpPr>
+      <p:grpSpPr/>
+      <p:pic>
+        <p:nvPicPr>
+          <p:cNvPr id="2" name="Picture 1" descr="modify_d1_d2_03.png"/>
+          <p:cNvPicPr>
+            <a:picLocks noChangeAspect="1"/>
+          </p:cNvPicPr>
+          <p:nvPr/>
+        </p:nvPicPr>
+        <p:blipFill>
+          <a:blip r:embed="rId2"/>
+          <a:stretch>
+            <a:fillRect/>
+          </a:stretch>
+        </p:blipFill>
+        <p:spPr>
+          <a:xfrm>
+            <a:off x="402336" y="457200"/>
+            <a:ext cx="5486400" cy="3200400"/>
+          </a:xfrm>
+          <a:prstGeom prst="rect">
+            <a:avLst/>
+          </a:prstGeom>
+        </p:spPr>
+      </p:pic>
+      <p:pic>
+        <p:nvPicPr>
+          <p:cNvPr id="3" name="Picture 2" descr="modify_d1_d2_04.png"/>
+          <p:cNvPicPr>
+            <a:picLocks noChangeAspect="1"/>
+          </p:cNvPicPr>
+          <p:nvPr/>
+        </p:nvPicPr>
+        <p:blipFill>
+          <a:blip r:embed="rId3"/>
+          <a:stretch>
+            <a:fillRect/>
+          </a:stretch>
+        </p:blipFill>
+        <p:spPr>
+          <a:xfrm>
+            <a:off x="402336" y="3657600"/>
+            <a:ext cx="5486400" cy="3200400"/>
+          </a:xfrm>
+          <a:prstGeom prst="rect">
+            <a:avLst/>
+          </a:prstGeom>
+        </p:spPr>
+      </p:pic>
+      <p:pic>
+        <p:nvPicPr>
+          <p:cNvPr id="4" name="Picture 3" descr="modify_d1_d2_27.png"/>
+          <p:cNvPicPr>
+            <a:picLocks noChangeAspect="1"/>
+          </p:cNvPicPr>
+          <p:nvPr/>
+        </p:nvPicPr>
+        <p:blipFill>
+          <a:blip r:embed="rId4"/>
+          <a:stretch>
+            <a:fillRect/>
+          </a:stretch>
+        </p:blipFill>
+        <p:spPr>
+          <a:xfrm>
+            <a:off x="6300216" y="457200"/>
+            <a:ext cx="5486400" cy="3200400"/>
+          </a:xfrm>
+          <a:prstGeom prst="rect">
+            <a:avLst/>
+          </a:prstGeom>
+        </p:spPr>
+      </p:pic>
+      <p:pic>
+        <p:nvPicPr>
+          <p:cNvPr id="5" name="Picture 4" descr="modify_d1_d2_28.png"/>
+          <p:cNvPicPr>
+            <a:picLocks noChangeAspect="1"/>
+          </p:cNvPicPr>
+          <p:nvPr/>
+        </p:nvPicPr>
+        <p:blipFill>
+          <a:blip r:embed="rId5"/>
+          <a:stretch>
+            <a:fillRect/>
+          </a:stretch>
+        </p:blipFill>
+        <p:spPr>
+          <a:xfrm>
+            <a:off x="6300216" y="3657600"/>
+            <a:ext cx="5486400" cy="3200400"/>
+          </a:xfrm>
+          <a:prstGeom prst="rect">
+            <a:avLst/>
+          </a:prstGeom>
+        </p:spPr>
+      </p:pic>
+      <p:sp>
+        <p:nvSpPr>
+          <p:cNvPr id="6" name="TextBox 5"/>
+          <p:cNvSpPr txBox="1"/>
+          <p:nvPr/>
+        </p:nvSpPr>
+        <p:spPr>
+          <a:xfrm>
+            <a:off x="0" y="0"/>
+            <a:ext cx="12188952" cy="457200"/>
+          </a:xfrm>
+          <a:prstGeom prst="rect">
+            <a:avLst/>
+          </a:prstGeom>
+          <a:noFill/>
+        </p:spPr>
+        <p:txBody>
+          <a:bodyPr wrap="none">
+            <a:spAutoFit/>
+          </a:bodyPr>
+          <a:lstStyle/>
+          <a:p>
+            <a:pPr algn="ctr"/>
+            <a:r>
+              <a:rPr sz="2400" b="1"/>
+              <a:t>fit1p.mps</a:t>
+            </a:r>
+          </a:p>
+        </p:txBody>
+      </p:sp>
+    </p:spTree>
+  </p:cSld>
+  <p:clrMapOvr>
+    <a:masterClrMapping/>
+  </p:clrMapOvr>
+</p:sld>
+</file>
+
+<file path=ppt/slides/slide13.xml><?xml version="1.0" encoding="utf-8"?>
+<p:sld xmlns:a="http://schemas.openxmlformats.org/drawingml/2006/main" xmlns:p="http://schemas.openxmlformats.org/presentationml/2006/main" xmlns:r="http://schemas.openxmlformats.org/officeDocument/2006/relationships">
+  <p:cSld>
+    <p:spTree>
+      <p:nvGrpSpPr>
+        <p:cNvPr id="1" name=""/>
+        <p:cNvGrpSpPr/>
+        <p:nvPr/>
+      </p:nvGrpSpPr>
+      <p:grpSpPr/>
+      <p:pic>
+        <p:nvPicPr>
+          <p:cNvPr id="2" name="Picture 1" descr="modify_d1_d2_02.png"/>
+          <p:cNvPicPr>
+            <a:picLocks noChangeAspect="1"/>
+          </p:cNvPicPr>
+          <p:nvPr/>
+        </p:nvPicPr>
+        <p:blipFill>
+          <a:blip r:embed="rId2"/>
+          <a:stretch>
+            <a:fillRect/>
+          </a:stretch>
+        </p:blipFill>
+        <p:spPr>
+          <a:xfrm>
+            <a:off x="402336" y="457200"/>
+            <a:ext cx="5486400" cy="3200400"/>
+          </a:xfrm>
+          <a:prstGeom prst="rect">
+            <a:avLst/>
+          </a:prstGeom>
+        </p:spPr>
+      </p:pic>
+      <p:pic>
+        <p:nvPicPr>
+          <p:cNvPr id="3" name="Picture 2" descr="modify_d1_d2_01.png"/>
+          <p:cNvPicPr>
+            <a:picLocks noChangeAspect="1"/>
+          </p:cNvPicPr>
+          <p:nvPr/>
+        </p:nvPicPr>
+        <p:blipFill>
+          <a:blip r:embed="rId3"/>
+          <a:stretch>
+            <a:fillRect/>
+          </a:stretch>
+        </p:blipFill>
+        <p:spPr>
+          <a:xfrm>
+            <a:off x="402336" y="3657600"/>
+            <a:ext cx="5486400" cy="3200400"/>
+          </a:xfrm>
+          <a:prstGeom prst="rect">
+            <a:avLst/>
+          </a:prstGeom>
+        </p:spPr>
+      </p:pic>
+      <p:pic>
+        <p:nvPicPr>
+          <p:cNvPr id="4" name="Picture 3" descr="modify_d1_d2_30.png"/>
+          <p:cNvPicPr>
+            <a:picLocks noChangeAspect="1"/>
+          </p:cNvPicPr>
+          <p:nvPr/>
+        </p:nvPicPr>
+        <p:blipFill>
+          <a:blip r:embed="rId4"/>
+          <a:stretch>
+            <a:fillRect/>
+          </a:stretch>
+        </p:blipFill>
+        <p:spPr>
+          <a:xfrm>
+            <a:off x="6300216" y="457200"/>
+            <a:ext cx="5486400" cy="3200400"/>
+          </a:xfrm>
+          <a:prstGeom prst="rect">
+            <a:avLst/>
+          </a:prstGeom>
+        </p:spPr>
+      </p:pic>
+      <p:pic>
+        <p:nvPicPr>
+          <p:cNvPr id="5" name="Picture 4" descr="modify_d1_d2_29.png"/>
+          <p:cNvPicPr>
+            <a:picLocks noChangeAspect="1"/>
+          </p:cNvPicPr>
+          <p:nvPr/>
+        </p:nvPicPr>
+        <p:blipFill>
+          <a:blip r:embed="rId5"/>
+          <a:stretch>
+            <a:fillRect/>
+          </a:stretch>
+        </p:blipFill>
+        <p:spPr>
+          <a:xfrm>
+            <a:off x="6300216" y="3657600"/>
+            <a:ext cx="5486400" cy="3200400"/>
+          </a:xfrm>
+          <a:prstGeom prst="rect">
+            <a:avLst/>
+          </a:prstGeom>
+        </p:spPr>
+      </p:pic>
+      <p:sp>
+        <p:nvSpPr>
+          <p:cNvPr id="6" name="TextBox 5"/>
+          <p:cNvSpPr txBox="1"/>
+          <p:nvPr/>
+        </p:nvSpPr>
+        <p:spPr>
+          <a:xfrm>
+            <a:off x="0" y="0"/>
+            <a:ext cx="12188952" cy="457200"/>
+          </a:xfrm>
+          <a:prstGeom prst="rect">
+            <a:avLst/>
+          </a:prstGeom>
+          <a:noFill/>
+        </p:spPr>
+        <p:txBody>
+          <a:bodyPr wrap="none">
+            <a:spAutoFit/>
+          </a:bodyPr>
+          <a:lstStyle/>
+          <a:p>
+            <a:pPr algn="ctr"/>
+            <a:r>
+              <a:rPr sz="2400" b="1"/>
+              <a:t>fit1p.mps</a:t>
+            </a:r>
+          </a:p>
+        </p:txBody>
+      </p:sp>
+    </p:spTree>
+  </p:cSld>
+  <p:clrMapOvr>
+    <a:masterClrMapping/>
+  </p:clrMapOvr>
+</p:sld>
+</file>
+
+<file path=ppt/slides/slide14.xml><?xml version="1.0" encoding="utf-8"?>
+<p:sld xmlns:a="http://schemas.openxmlformats.org/drawingml/2006/main" xmlns:p="http://schemas.openxmlformats.org/presentationml/2006/main" xmlns:r="http://schemas.openxmlformats.org/officeDocument/2006/relationships">
+  <p:cSld>
+    <p:spTree>
+      <p:nvGrpSpPr>
+        <p:cNvPr id="1" name=""/>
+        <p:cNvGrpSpPr/>
+        <p:nvPr/>
+      </p:nvGrpSpPr>
+      <p:grpSpPr/>
+      <p:pic>
+        <p:nvPicPr>
+          <p:cNvPr id="2" name="Picture 1" descr="modify_d1_d2_03.png"/>
+          <p:cNvPicPr>
+            <a:picLocks noChangeAspect="1"/>
+          </p:cNvPicPr>
+          <p:nvPr/>
+        </p:nvPicPr>
+        <p:blipFill>
+          <a:blip r:embed="rId2"/>
+          <a:stretch>
+            <a:fillRect/>
+          </a:stretch>
+        </p:blipFill>
+        <p:spPr>
+          <a:xfrm>
+            <a:off x="402336" y="457200"/>
+            <a:ext cx="5486400" cy="3200400"/>
+          </a:xfrm>
+          <a:prstGeom prst="rect">
+            <a:avLst/>
+          </a:prstGeom>
+        </p:spPr>
+      </p:pic>
+      <p:pic>
+        <p:nvPicPr>
+          <p:cNvPr id="3" name="Picture 2" descr="modify_d1_d2_04.png"/>
+          <p:cNvPicPr>
+            <a:picLocks noChangeAspect="1"/>
+          </p:cNvPicPr>
+          <p:nvPr/>
+        </p:nvPicPr>
+        <p:blipFill>
+          <a:blip r:embed="rId3"/>
+          <a:stretch>
+            <a:fillRect/>
+          </a:stretch>
+        </p:blipFill>
+        <p:spPr>
+          <a:xfrm>
+            <a:off x="402336" y="3657600"/>
+            <a:ext cx="5486400" cy="3200400"/>
+          </a:xfrm>
+          <a:prstGeom prst="rect">
+            <a:avLst/>
+          </a:prstGeom>
+        </p:spPr>
+      </p:pic>
+      <p:pic>
+        <p:nvPicPr>
+          <p:cNvPr id="4" name="Picture 3" descr="modify_d1_d2_31.png"/>
+          <p:cNvPicPr>
+            <a:picLocks noChangeAspect="1"/>
+          </p:cNvPicPr>
+          <p:nvPr/>
+        </p:nvPicPr>
+        <p:blipFill>
+          <a:blip r:embed="rId4"/>
+          <a:stretch>
+            <a:fillRect/>
+          </a:stretch>
+        </p:blipFill>
+        <p:spPr>
+          <a:xfrm>
+            <a:off x="6300216" y="457200"/>
+            <a:ext cx="5486400" cy="3200400"/>
+          </a:xfrm>
+          <a:prstGeom prst="rect">
+            <a:avLst/>
+          </a:prstGeom>
+        </p:spPr>
+      </p:pic>
+      <p:pic>
+        <p:nvPicPr>
+          <p:cNvPr id="5" name="Picture 4" descr="modify_d1_d2_32.png"/>
+          <p:cNvPicPr>
+            <a:picLocks noChangeAspect="1"/>
+          </p:cNvPicPr>
+          <p:nvPr/>
+        </p:nvPicPr>
+        <p:blipFill>
+          <a:blip r:embed="rId5"/>
+          <a:stretch>
+            <a:fillRect/>
+          </a:stretch>
+        </p:blipFill>
+        <p:spPr>
+          <a:xfrm>
+            <a:off x="6300216" y="3657600"/>
+            <a:ext cx="5486400" cy="3200400"/>
+          </a:xfrm>
+          <a:prstGeom prst="rect">
+            <a:avLst/>
+          </a:prstGeom>
+        </p:spPr>
+      </p:pic>
+      <p:sp>
+        <p:nvSpPr>
+          <p:cNvPr id="6" name="TextBox 5"/>
+          <p:cNvSpPr txBox="1"/>
+          <p:nvPr/>
+        </p:nvSpPr>
+        <p:spPr>
+          <a:xfrm>
+            <a:off x="0" y="0"/>
+            <a:ext cx="12188952" cy="457200"/>
+          </a:xfrm>
+          <a:prstGeom prst="rect">
+            <a:avLst/>
+          </a:prstGeom>
+          <a:noFill/>
+        </p:spPr>
+        <p:txBody>
+          <a:bodyPr wrap="none">
+            <a:spAutoFit/>
+          </a:bodyPr>
+          <a:lstStyle/>
+          <a:p>
+            <a:pPr algn="ctr"/>
+            <a:r>
+              <a:rPr sz="2400" b="1"/>
+              <a:t>fit1p.mps</a:t>
+            </a:r>
+          </a:p>
+        </p:txBody>
+      </p:sp>
+    </p:spTree>
+  </p:cSld>
+  <p:clrMapOvr>
+    <a:masterClrMapping/>
+  </p:clrMapOvr>
+</p:sld>
+</file>
+
+<file path=ppt/slides/slide15.xml><?xml version="1.0" encoding="utf-8"?>
+<p:sld xmlns:a="http://schemas.openxmlformats.org/drawingml/2006/main" xmlns:p="http://schemas.openxmlformats.org/presentationml/2006/main" xmlns:r="http://schemas.openxmlformats.org/officeDocument/2006/relationships">
+  <p:cSld>
+    <p:spTree>
+      <p:nvGrpSpPr>
+        <p:cNvPr id="1" name=""/>
+        <p:cNvGrpSpPr/>
+        <p:nvPr/>
+      </p:nvGrpSpPr>
+      <p:grpSpPr/>
+      <p:pic>
+        <p:nvPicPr>
+          <p:cNvPr id="2" name="Picture 1" descr="modify_d1_d2_02.png"/>
+          <p:cNvPicPr>
+            <a:picLocks noChangeAspect="1"/>
+          </p:cNvPicPr>
+          <p:nvPr/>
+        </p:nvPicPr>
+        <p:blipFill>
+          <a:blip r:embed="rId2"/>
+          <a:stretch>
+            <a:fillRect/>
+          </a:stretch>
+        </p:blipFill>
+        <p:spPr>
+          <a:xfrm>
+            <a:off x="402336" y="457200"/>
+            <a:ext cx="5486400" cy="3200400"/>
+          </a:xfrm>
+          <a:prstGeom prst="rect">
+            <a:avLst/>
+          </a:prstGeom>
+        </p:spPr>
+      </p:pic>
+      <p:pic>
+        <p:nvPicPr>
+          <p:cNvPr id="3" name="Picture 2" descr="modify_d1_d2_01.png"/>
+          <p:cNvPicPr>
+            <a:picLocks noChangeAspect="1"/>
+          </p:cNvPicPr>
+          <p:nvPr/>
+        </p:nvPicPr>
+        <p:blipFill>
+          <a:blip r:embed="rId3"/>
+          <a:stretch>
+            <a:fillRect/>
+          </a:stretch>
+        </p:blipFill>
+        <p:spPr>
+          <a:xfrm>
+            <a:off x="402336" y="3657600"/>
+            <a:ext cx="5486400" cy="3200400"/>
+          </a:xfrm>
+          <a:prstGeom prst="rect">
+            <a:avLst/>
+          </a:prstGeom>
+        </p:spPr>
+      </p:pic>
+      <p:pic>
+        <p:nvPicPr>
+          <p:cNvPr id="4" name="Picture 3" descr="modify_d1_d2_34.png"/>
+          <p:cNvPicPr>
+            <a:picLocks noChangeAspect="1"/>
+          </p:cNvPicPr>
+          <p:nvPr/>
+        </p:nvPicPr>
+        <p:blipFill>
+          <a:blip r:embed="rId4"/>
+          <a:stretch>
+            <a:fillRect/>
+          </a:stretch>
+        </p:blipFill>
+        <p:spPr>
+          <a:xfrm>
+            <a:off x="6300216" y="457200"/>
+            <a:ext cx="5486400" cy="3200400"/>
+          </a:xfrm>
+          <a:prstGeom prst="rect">
+            <a:avLst/>
+          </a:prstGeom>
+        </p:spPr>
+      </p:pic>
+      <p:pic>
+        <p:nvPicPr>
+          <p:cNvPr id="5" name="Picture 4" descr="modify_d1_d2_33.png"/>
+          <p:cNvPicPr>
+            <a:picLocks noChangeAspect="1"/>
+          </p:cNvPicPr>
+          <p:nvPr/>
+        </p:nvPicPr>
+        <p:blipFill>
+          <a:blip r:embed="rId5"/>
+          <a:stretch>
+            <a:fillRect/>
+          </a:stretch>
+        </p:blipFill>
+        <p:spPr>
+          <a:xfrm>
+            <a:off x="6300216" y="3657600"/>
+            <a:ext cx="5486400" cy="3200400"/>
+          </a:xfrm>
+          <a:prstGeom prst="rect">
+            <a:avLst/>
+          </a:prstGeom>
+        </p:spPr>
+      </p:pic>
+      <p:sp>
+        <p:nvSpPr>
+          <p:cNvPr id="6" name="TextBox 5"/>
+          <p:cNvSpPr txBox="1"/>
+          <p:nvPr/>
+        </p:nvSpPr>
+        <p:spPr>
+          <a:xfrm>
+            <a:off x="0" y="0"/>
+            <a:ext cx="12188952" cy="457200"/>
+          </a:xfrm>
+          <a:prstGeom prst="rect">
+            <a:avLst/>
+          </a:prstGeom>
+          <a:noFill/>
+        </p:spPr>
+        <p:txBody>
+          <a:bodyPr wrap="none">
+            <a:spAutoFit/>
+          </a:bodyPr>
+          <a:lstStyle/>
+          <a:p>
+            <a:pPr algn="ctr"/>
+            <a:r>
+              <a:rPr sz="2400" b="1"/>
+              <a:t>fit1p.mps</a:t>
+            </a:r>
+          </a:p>
+        </p:txBody>
+      </p:sp>
+    </p:spTree>
+  </p:cSld>
+  <p:clrMapOvr>
+    <a:masterClrMapping/>
+  </p:clrMapOvr>
+</p:sld>
+</file>
+
+<file path=ppt/slides/slide16.xml><?xml version="1.0" encoding="utf-8"?>
+<p:sld xmlns:a="http://schemas.openxmlformats.org/drawingml/2006/main" xmlns:p="http://schemas.openxmlformats.org/presentationml/2006/main" xmlns:r="http://schemas.openxmlformats.org/officeDocument/2006/relationships">
+  <p:cSld>
+    <p:spTree>
+      <p:nvGrpSpPr>
+        <p:cNvPr id="1" name=""/>
+        <p:cNvGrpSpPr/>
+        <p:nvPr/>
+      </p:nvGrpSpPr>
+      <p:grpSpPr/>
+      <p:pic>
+        <p:nvPicPr>
+          <p:cNvPr id="2" name="Picture 1" descr="modify_d1_d2_03.png"/>
+          <p:cNvPicPr>
+            <a:picLocks noChangeAspect="1"/>
+          </p:cNvPicPr>
+          <p:nvPr/>
+        </p:nvPicPr>
+        <p:blipFill>
+          <a:blip r:embed="rId2"/>
+          <a:stretch>
+            <a:fillRect/>
+          </a:stretch>
+        </p:blipFill>
+        <p:spPr>
+          <a:xfrm>
+            <a:off x="402336" y="457200"/>
+            <a:ext cx="5486400" cy="3200400"/>
+          </a:xfrm>
+          <a:prstGeom prst="rect">
+            <a:avLst/>
+          </a:prstGeom>
+        </p:spPr>
+      </p:pic>
+      <p:pic>
+        <p:nvPicPr>
+          <p:cNvPr id="3" name="Picture 2" descr="modify_d1_d2_04.png"/>
+          <p:cNvPicPr>
+            <a:picLocks noChangeAspect="1"/>
+          </p:cNvPicPr>
+          <p:nvPr/>
+        </p:nvPicPr>
+        <p:blipFill>
+          <a:blip r:embed="rId3"/>
+          <a:stretch>
+            <a:fillRect/>
+          </a:stretch>
+        </p:blipFill>
+        <p:spPr>
+          <a:xfrm>
+            <a:off x="402336" y="3657600"/>
+            <a:ext cx="5486400" cy="3200400"/>
+          </a:xfrm>
+          <a:prstGeom prst="rect">
+            <a:avLst/>
+          </a:prstGeom>
+        </p:spPr>
+      </p:pic>
+      <p:pic>
+        <p:nvPicPr>
+          <p:cNvPr id="4" name="Picture 3" descr="modify_d1_d2_35.png"/>
+          <p:cNvPicPr>
+            <a:picLocks noChangeAspect="1"/>
+          </p:cNvPicPr>
+          <p:nvPr/>
+        </p:nvPicPr>
+        <p:blipFill>
+          <a:blip r:embed="rId4"/>
+          <a:stretch>
+            <a:fillRect/>
+          </a:stretch>
+        </p:blipFill>
+        <p:spPr>
+          <a:xfrm>
+            <a:off x="6300216" y="457200"/>
+            <a:ext cx="5486400" cy="3200400"/>
+          </a:xfrm>
+          <a:prstGeom prst="rect">
+            <a:avLst/>
+          </a:prstGeom>
+        </p:spPr>
+      </p:pic>
+      <p:pic>
+        <p:nvPicPr>
+          <p:cNvPr id="5" name="Picture 4" descr="modify_d1_d2_36.png"/>
+          <p:cNvPicPr>
+            <a:picLocks noChangeAspect="1"/>
+          </p:cNvPicPr>
+          <p:nvPr/>
+        </p:nvPicPr>
+        <p:blipFill>
+          <a:blip r:embed="rId5"/>
+          <a:stretch>
+            <a:fillRect/>
+          </a:stretch>
+        </p:blipFill>
+        <p:spPr>
+          <a:xfrm>
+            <a:off x="6300216" y="3657600"/>
+            <a:ext cx="5486400" cy="3200400"/>
+          </a:xfrm>
+          <a:prstGeom prst="rect">
+            <a:avLst/>
+          </a:prstGeom>
+        </p:spPr>
+      </p:pic>
+      <p:sp>
+        <p:nvSpPr>
+          <p:cNvPr id="6" name="TextBox 5"/>
+          <p:cNvSpPr txBox="1"/>
+          <p:nvPr/>
+        </p:nvSpPr>
+        <p:spPr>
+          <a:xfrm>
+            <a:off x="0" y="0"/>
+            <a:ext cx="12188952" cy="457200"/>
+          </a:xfrm>
+          <a:prstGeom prst="rect">
+            <a:avLst/>
+          </a:prstGeom>
+          <a:noFill/>
+        </p:spPr>
+        <p:txBody>
+          <a:bodyPr wrap="none">
+            <a:spAutoFit/>
+          </a:bodyPr>
+          <a:lstStyle/>
+          <a:p>
+            <a:pPr algn="ctr"/>
+            <a:r>
+              <a:rPr sz="2400" b="1"/>
+              <a:t>fit1p.mps</a:t>
+            </a:r>
+          </a:p>
+        </p:txBody>
+      </p:sp>
+    </p:spTree>
+  </p:cSld>
+  <p:clrMapOvr>
+    <a:masterClrMapping/>
+  </p:clrMapOvr>
+</p:sld>
+</file>
+
+<file path=ppt/slides/slide2.xml><?xml version="1.0" encoding="utf-8"?>
+<p:sld xmlns:a="http://schemas.openxmlformats.org/drawingml/2006/main" xmlns:p="http://schemas.openxmlformats.org/presentationml/2006/main" xmlns:r="http://schemas.openxmlformats.org/officeDocument/2006/relationships">
+  <p:cSld>
+    <p:spTree>
+      <p:nvGrpSpPr>
+        <p:cNvPr id="1" name=""/>
+        <p:cNvGrpSpPr/>
+        <p:nvPr/>
+      </p:nvGrpSpPr>
+      <p:grpSpPr/>
+      <p:pic>
+        <p:nvPicPr>
+          <p:cNvPr id="2" name="Picture 1" descr="modify_d1_d2_03.png"/>
+          <p:cNvPicPr>
+            <a:picLocks noChangeAspect="1"/>
+          </p:cNvPicPr>
+          <p:nvPr/>
+        </p:nvPicPr>
+        <p:blipFill>
+          <a:blip r:embed="rId2"/>
+          <a:stretch>
+            <a:fillRect/>
+          </a:stretch>
+        </p:blipFill>
+        <p:spPr>
+          <a:xfrm>
+            <a:off x="402336" y="457200"/>
+            <a:ext cx="5486400" cy="3200400"/>
+          </a:xfrm>
+          <a:prstGeom prst="rect">
+            <a:avLst/>
+          </a:prstGeom>
+        </p:spPr>
+      </p:pic>
+      <p:pic>
+        <p:nvPicPr>
+          <p:cNvPr id="3" name="Picture 2" descr="modify_d1_d2_04.png"/>
+          <p:cNvPicPr>
+            <a:picLocks noChangeAspect="1"/>
+          </p:cNvPicPr>
+          <p:nvPr/>
+        </p:nvPicPr>
+        <p:blipFill>
+          <a:blip r:embed="rId3"/>
+          <a:stretch>
+            <a:fillRect/>
+          </a:stretch>
+        </p:blipFill>
+        <p:spPr>
+          <a:xfrm>
+            <a:off x="402336" y="3657600"/>
+            <a:ext cx="5486400" cy="3200400"/>
+          </a:xfrm>
+          <a:prstGeom prst="rect">
+            <a:avLst/>
+          </a:prstGeom>
+        </p:spPr>
+      </p:pic>
+      <p:pic>
+        <p:nvPicPr>
+          <p:cNvPr id="4" name="Picture 3" descr="modify_d1_d2_07.png"/>
+          <p:cNvPicPr>
+            <a:picLocks noChangeAspect="1"/>
+          </p:cNvPicPr>
+          <p:nvPr/>
+        </p:nvPicPr>
+        <p:blipFill>
+          <a:blip r:embed="rId4"/>
+          <a:stretch>
+            <a:fillRect/>
+          </a:stretch>
+        </p:blipFill>
+        <p:spPr>
+          <a:xfrm>
+            <a:off x="6300216" y="457200"/>
+            <a:ext cx="5486400" cy="3200400"/>
+          </a:xfrm>
+          <a:prstGeom prst="rect">
+            <a:avLst/>
+          </a:prstGeom>
+        </p:spPr>
+      </p:pic>
+      <p:pic>
+        <p:nvPicPr>
+          <p:cNvPr id="5" name="Picture 4" descr="modify_d1_d2_08.png"/>
+          <p:cNvPicPr>
+            <a:picLocks noChangeAspect="1"/>
+          </p:cNvPicPr>
+          <p:nvPr/>
+        </p:nvPicPr>
+        <p:blipFill>
+          <a:blip r:embed="rId5"/>
+          <a:stretch>
+            <a:fillRect/>
+          </a:stretch>
+        </p:blipFill>
+        <p:spPr>
+          <a:xfrm>
+            <a:off x="6300216" y="3657600"/>
+            <a:ext cx="5486400" cy="3200400"/>
+          </a:xfrm>
+          <a:prstGeom prst="rect">
+            <a:avLst/>
+          </a:prstGeom>
+        </p:spPr>
+      </p:pic>
+      <p:sp>
+        <p:nvSpPr>
+          <p:cNvPr id="6" name="TextBox 5"/>
+          <p:cNvSpPr txBox="1"/>
+          <p:nvPr/>
+        </p:nvSpPr>
+        <p:spPr>
+          <a:xfrm>
+            <a:off x="0" y="0"/>
+            <a:ext cx="12188952" cy="457200"/>
+          </a:xfrm>
+          <a:prstGeom prst="rect">
+            <a:avLst/>
+          </a:prstGeom>
+          <a:noFill/>
+        </p:spPr>
+        <p:txBody>
+          <a:bodyPr wrap="none">
+            <a:spAutoFit/>
+          </a:bodyPr>
+          <a:lstStyle/>
+          <a:p>
+            <a:pPr algn="ctr"/>
+            <a:r>
+              <a:rPr sz="2400" b="1"/>
+              <a:t>fit1p.mps</a:t>
+            </a:r>
+          </a:p>
+        </p:txBody>
+      </p:sp>
+    </p:spTree>
+  </p:cSld>
+  <p:clrMapOvr>
+    <a:masterClrMapping/>
+  </p:clrMapOvr>
+</p:sld>
+</file>
+
+<file path=ppt/slides/slide3.xml><?xml version="1.0" encoding="utf-8"?>
+<p:sld xmlns:a="http://schemas.openxmlformats.org/drawingml/2006/main" xmlns:p="http://schemas.openxmlformats.org/presentationml/2006/main" xmlns:r="http://schemas.openxmlformats.org/officeDocument/2006/relationships">
+  <p:cSld>
+    <p:spTree>
+      <p:nvGrpSpPr>
+        <p:cNvPr id="1" name=""/>
+        <p:cNvGrpSpPr/>
+        <p:nvPr/>
+      </p:nvGrpSpPr>
+      <p:grpSpPr/>
+      <p:pic>
+        <p:nvPicPr>
+          <p:cNvPr id="2" name="Picture 1" descr="modify_d1_d2_02.png"/>
+          <p:cNvPicPr>
+            <a:picLocks noChangeAspect="1"/>
+          </p:cNvPicPr>
+          <p:nvPr/>
+        </p:nvPicPr>
+        <p:blipFill>
+          <a:blip r:embed="rId2"/>
+          <a:stretch>
+            <a:fillRect/>
+          </a:stretch>
+        </p:blipFill>
+        <p:spPr>
+          <a:xfrm>
+            <a:off x="402336" y="457200"/>
+            <a:ext cx="5486400" cy="3200400"/>
+          </a:xfrm>
+          <a:prstGeom prst="rect">
+            <a:avLst/>
+          </a:prstGeom>
+        </p:spPr>
+      </p:pic>
+      <p:pic>
+        <p:nvPicPr>
+          <p:cNvPr id="3" name="Picture 2" descr="modify_d1_d2_01.png"/>
+          <p:cNvPicPr>
+            <a:picLocks noChangeAspect="1"/>
+          </p:cNvPicPr>
+          <p:nvPr/>
+        </p:nvPicPr>
+        <p:blipFill>
+          <a:blip r:embed="rId3"/>
+          <a:stretch>
+            <a:fillRect/>
+          </a:stretch>
+        </p:blipFill>
+        <p:spPr>
+          <a:xfrm>
+            <a:off x="402336" y="3657600"/>
+            <a:ext cx="5486400" cy="3200400"/>
+          </a:xfrm>
+          <a:prstGeom prst="rect">
+            <a:avLst/>
+          </a:prstGeom>
+        </p:spPr>
+      </p:pic>
+      <p:pic>
+        <p:nvPicPr>
+          <p:cNvPr id="4" name="Picture 3" descr="modify_d1_d2_10.png"/>
+          <p:cNvPicPr>
+            <a:picLocks noChangeAspect="1"/>
+          </p:cNvPicPr>
+          <p:nvPr/>
+        </p:nvPicPr>
+        <p:blipFill>
+          <a:blip r:embed="rId4"/>
+          <a:stretch>
+            <a:fillRect/>
+          </a:stretch>
+        </p:blipFill>
+        <p:spPr>
+          <a:xfrm>
+            <a:off x="6300216" y="457200"/>
+            <a:ext cx="5486400" cy="3200400"/>
+          </a:xfrm>
+          <a:prstGeom prst="rect">
+            <a:avLst/>
+          </a:prstGeom>
+        </p:spPr>
+      </p:pic>
+      <p:pic>
+        <p:nvPicPr>
+          <p:cNvPr id="5" name="Picture 4" descr="modify_d1_d2_09.png"/>
+          <p:cNvPicPr>
+            <a:picLocks noChangeAspect="1"/>
+          </p:cNvPicPr>
+          <p:nvPr/>
+        </p:nvPicPr>
+        <p:blipFill>
+          <a:blip r:embed="rId5"/>
+          <a:stretch>
+            <a:fillRect/>
+          </a:stretch>
+        </p:blipFill>
+        <p:spPr>
+          <a:xfrm>
+            <a:off x="6300216" y="3657600"/>
+            <a:ext cx="5486400" cy="3200400"/>
+          </a:xfrm>
+          <a:prstGeom prst="rect">
+            <a:avLst/>
+          </a:prstGeom>
+        </p:spPr>
+      </p:pic>
+      <p:sp>
+        <p:nvSpPr>
+          <p:cNvPr id="6" name="TextBox 5"/>
+          <p:cNvSpPr txBox="1"/>
+          <p:nvPr/>
+        </p:nvSpPr>
+        <p:spPr>
+          <a:xfrm>
+            <a:off x="0" y="0"/>
+            <a:ext cx="12188952" cy="457200"/>
+          </a:xfrm>
+          <a:prstGeom prst="rect">
+            <a:avLst/>
+          </a:prstGeom>
+          <a:noFill/>
+        </p:spPr>
+        <p:txBody>
+          <a:bodyPr wrap="none">
+            <a:spAutoFit/>
+          </a:bodyPr>
+          <a:lstStyle/>
+          <a:p>
+            <a:pPr algn="ctr"/>
+            <a:r>
+              <a:rPr sz="2400" b="1"/>
+              <a:t>fit1p.mps</a:t>
+            </a:r>
+          </a:p>
+        </p:txBody>
+      </p:sp>
+    </p:spTree>
+  </p:cSld>
+  <p:clrMapOvr>
+    <a:masterClrMapping/>
+  </p:clrMapOvr>
+</p:sld>
+</file>
+
+<file path=ppt/slides/slide4.xml><?xml version="1.0" encoding="utf-8"?>
+<p:sld xmlns:a="http://schemas.openxmlformats.org/drawingml/2006/main" xmlns:p="http://schemas.openxmlformats.org/presentationml/2006/main" xmlns:r="http://schemas.openxmlformats.org/officeDocument/2006/relationships">
+  <p:cSld>
+    <p:spTree>
+      <p:nvGrpSpPr>
+        <p:cNvPr id="1" name=""/>
+        <p:cNvGrpSpPr/>
+        <p:nvPr/>
+      </p:nvGrpSpPr>
+      <p:grpSpPr/>
+      <p:pic>
+        <p:nvPicPr>
+          <p:cNvPr id="2" name="Picture 1" descr="modify_d1_d2_03.png"/>
+          <p:cNvPicPr>
+            <a:picLocks noChangeAspect="1"/>
+          </p:cNvPicPr>
+          <p:nvPr/>
+        </p:nvPicPr>
+        <p:blipFill>
+          <a:blip r:embed="rId2"/>
+          <a:stretch>
+            <a:fillRect/>
+          </a:stretch>
+        </p:blipFill>
+        <p:spPr>
+          <a:xfrm>
+            <a:off x="402336" y="457200"/>
+            <a:ext cx="5486400" cy="3200400"/>
+          </a:xfrm>
+          <a:prstGeom prst="rect">
+            <a:avLst/>
+          </a:prstGeom>
+        </p:spPr>
+      </p:pic>
+      <p:pic>
+        <p:nvPicPr>
+          <p:cNvPr id="3" name="Picture 2" descr="modify_d1_d2_04.png"/>
+          <p:cNvPicPr>
+            <a:picLocks noChangeAspect="1"/>
+          </p:cNvPicPr>
+          <p:nvPr/>
+        </p:nvPicPr>
+        <p:blipFill>
+          <a:blip r:embed="rId3"/>
+          <a:stretch>
+            <a:fillRect/>
+          </a:stretch>
+        </p:blipFill>
+        <p:spPr>
+          <a:xfrm>
+            <a:off x="402336" y="3657600"/>
+            <a:ext cx="5486400" cy="3200400"/>
+          </a:xfrm>
+          <a:prstGeom prst="rect">
+            <a:avLst/>
+          </a:prstGeom>
+        </p:spPr>
+      </p:pic>
+      <p:pic>
+        <p:nvPicPr>
+          <p:cNvPr id="4" name="Picture 3" descr="modify_d1_d2_11.png"/>
+          <p:cNvPicPr>
+            <a:picLocks noChangeAspect="1"/>
+          </p:cNvPicPr>
+          <p:nvPr/>
+        </p:nvPicPr>
+        <p:blipFill>
+          <a:blip r:embed="rId4"/>
+          <a:stretch>
+            <a:fillRect/>
+          </a:stretch>
+        </p:blipFill>
+        <p:spPr>
+          <a:xfrm>
+            <a:off x="6300216" y="457200"/>
+            <a:ext cx="5486400" cy="3200400"/>
+          </a:xfrm>
+          <a:prstGeom prst="rect">
+            <a:avLst/>
+          </a:prstGeom>
+        </p:spPr>
+      </p:pic>
+      <p:pic>
+        <p:nvPicPr>
+          <p:cNvPr id="5" name="Picture 4" descr="modify_d1_d2_12.png"/>
+          <p:cNvPicPr>
+            <a:picLocks noChangeAspect="1"/>
+          </p:cNvPicPr>
+          <p:nvPr/>
+        </p:nvPicPr>
+        <p:blipFill>
+          <a:blip r:embed="rId5"/>
+          <a:stretch>
+            <a:fillRect/>
+          </a:stretch>
+        </p:blipFill>
+        <p:spPr>
+          <a:xfrm>
+            <a:off x="6300216" y="3657600"/>
+            <a:ext cx="5486400" cy="3200400"/>
+          </a:xfrm>
+          <a:prstGeom prst="rect">
+            <a:avLst/>
+          </a:prstGeom>
+        </p:spPr>
+      </p:pic>
+      <p:sp>
+        <p:nvSpPr>
+          <p:cNvPr id="6" name="TextBox 5"/>
+          <p:cNvSpPr txBox="1"/>
+          <p:nvPr/>
+        </p:nvSpPr>
+        <p:spPr>
+          <a:xfrm>
+            <a:off x="0" y="0"/>
+            <a:ext cx="12188952" cy="457200"/>
+          </a:xfrm>
+          <a:prstGeom prst="rect">
+            <a:avLst/>
+          </a:prstGeom>
+          <a:noFill/>
+        </p:spPr>
+        <p:txBody>
+          <a:bodyPr wrap="none">
+            <a:spAutoFit/>
+          </a:bodyPr>
+          <a:lstStyle/>
+          <a:p>
+            <a:pPr algn="ctr"/>
+            <a:r>
+              <a:rPr sz="2400" b="1"/>
+              <a:t>fit1p.mps</a:t>
+            </a:r>
+          </a:p>
+        </p:txBody>
+      </p:sp>
+    </p:spTree>
+  </p:cSld>
+  <p:clrMapOvr>
+    <a:masterClrMapping/>
+  </p:clrMapOvr>
+</p:sld>
+</file>
+
+<file path=ppt/slides/slide5.xml><?xml version="1.0" encoding="utf-8"?>
+<p:sld xmlns:a="http://schemas.openxmlformats.org/drawingml/2006/main" xmlns:p="http://schemas.openxmlformats.org/presentationml/2006/main" xmlns:r="http://schemas.openxmlformats.org/officeDocument/2006/relationships">
+  <p:cSld>
+    <p:spTree>
+      <p:nvGrpSpPr>
+        <p:cNvPr id="1" name=""/>
+        <p:cNvGrpSpPr/>
+        <p:nvPr/>
+      </p:nvGrpSpPr>
+      <p:grpSpPr/>
+      <p:pic>
+        <p:nvPicPr>
+          <p:cNvPr id="2" name="Picture 1" descr="modify_d1_d2_02.png"/>
+          <p:cNvPicPr>
+            <a:picLocks noChangeAspect="1"/>
+          </p:cNvPicPr>
+          <p:nvPr/>
+        </p:nvPicPr>
+        <p:blipFill>
+          <a:blip r:embed="rId2"/>
+          <a:stretch>
+            <a:fillRect/>
+          </a:stretch>
+        </p:blipFill>
+        <p:spPr>
+          <a:xfrm>
+            <a:off x="402336" y="457200"/>
+            <a:ext cx="5486400" cy="3200400"/>
+          </a:xfrm>
+          <a:prstGeom prst="rect">
+            <a:avLst/>
+          </a:prstGeom>
+        </p:spPr>
+      </p:pic>
+      <p:pic>
+        <p:nvPicPr>
+          <p:cNvPr id="3" name="Picture 2" descr="modify_d1_d2_01.png"/>
+          <p:cNvPicPr>
+            <a:picLocks noChangeAspect="1"/>
+          </p:cNvPicPr>
+          <p:nvPr/>
+        </p:nvPicPr>
+        <p:blipFill>
+          <a:blip r:embed="rId3"/>
+          <a:stretch>
+            <a:fillRect/>
+          </a:stretch>
+        </p:blipFill>
+        <p:spPr>
+          <a:xfrm>
+            <a:off x="402336" y="3657600"/>
+            <a:ext cx="5486400" cy="3200400"/>
+          </a:xfrm>
+          <a:prstGeom prst="rect">
+            <a:avLst/>
+          </a:prstGeom>
+        </p:spPr>
+      </p:pic>
+      <p:pic>
+        <p:nvPicPr>
+          <p:cNvPr id="4" name="Picture 3" descr="modify_d1_d2_14.png"/>
+          <p:cNvPicPr>
+            <a:picLocks noChangeAspect="1"/>
+          </p:cNvPicPr>
+          <p:nvPr/>
+        </p:nvPicPr>
+        <p:blipFill>
+          <a:blip r:embed="rId4"/>
+          <a:stretch>
+            <a:fillRect/>
+          </a:stretch>
+        </p:blipFill>
+        <p:spPr>
+          <a:xfrm>
+            <a:off x="6300216" y="457200"/>
+            <a:ext cx="5486400" cy="3200400"/>
+          </a:xfrm>
+          <a:prstGeom prst="rect">
+            <a:avLst/>
+          </a:prstGeom>
+        </p:spPr>
+      </p:pic>
+      <p:pic>
+        <p:nvPicPr>
+          <p:cNvPr id="5" name="Picture 4" descr="modify_d1_d2_13.png"/>
+          <p:cNvPicPr>
+            <a:picLocks noChangeAspect="1"/>
+          </p:cNvPicPr>
+          <p:nvPr/>
+        </p:nvPicPr>
+        <p:blipFill>
+          <a:blip r:embed="rId5"/>
+          <a:stretch>
+            <a:fillRect/>
+          </a:stretch>
+        </p:blipFill>
+        <p:spPr>
+          <a:xfrm>
+            <a:off x="6300216" y="3657600"/>
+            <a:ext cx="5486400" cy="3200400"/>
+          </a:xfrm>
+          <a:prstGeom prst="rect">
+            <a:avLst/>
+          </a:prstGeom>
+        </p:spPr>
+      </p:pic>
+      <p:sp>
+        <p:nvSpPr>
+          <p:cNvPr id="6" name="TextBox 5"/>
+          <p:cNvSpPr txBox="1"/>
+          <p:nvPr/>
+        </p:nvSpPr>
+        <p:spPr>
+          <a:xfrm>
+            <a:off x="0" y="0"/>
+            <a:ext cx="12188952" cy="457200"/>
+          </a:xfrm>
+          <a:prstGeom prst="rect">
+            <a:avLst/>
+          </a:prstGeom>
+          <a:noFill/>
+        </p:spPr>
+        <p:txBody>
+          <a:bodyPr wrap="none">
+            <a:spAutoFit/>
+          </a:bodyPr>
+          <a:lstStyle/>
+          <a:p>
+            <a:pPr algn="ctr"/>
+            <a:r>
+              <a:rPr sz="2400" b="1"/>
+              <a:t>fit1p.mps</a:t>
+            </a:r>
+          </a:p>
+        </p:txBody>
+      </p:sp>
+    </p:spTree>
+  </p:cSld>
+  <p:clrMapOvr>
+    <a:masterClrMapping/>
+  </p:clrMapOvr>
+</p:sld>
+</file>
+
+<file path=ppt/slides/slide6.xml><?xml version="1.0" encoding="utf-8"?>
+<p:sld xmlns:a="http://schemas.openxmlformats.org/drawingml/2006/main" xmlns:p="http://schemas.openxmlformats.org/presentationml/2006/main" xmlns:r="http://schemas.openxmlformats.org/officeDocument/2006/relationships">
+  <p:cSld>
+    <p:spTree>
+      <p:nvGrpSpPr>
+        <p:cNvPr id="1" name=""/>
+        <p:cNvGrpSpPr/>
+        <p:nvPr/>
+      </p:nvGrpSpPr>
+      <p:grpSpPr/>
+      <p:pic>
+        <p:nvPicPr>
+          <p:cNvPr id="2" name="Picture 1" descr="modify_d1_d2_03.png"/>
+          <p:cNvPicPr>
+            <a:picLocks noChangeAspect="1"/>
+          </p:cNvPicPr>
+          <p:nvPr/>
+        </p:nvPicPr>
+        <p:blipFill>
+          <a:blip r:embed="rId2"/>
+          <a:stretch>
+            <a:fillRect/>
+          </a:stretch>
+        </p:blipFill>
+        <p:spPr>
+          <a:xfrm>
+            <a:off x="402336" y="457200"/>
+            <a:ext cx="5486400" cy="3200400"/>
+          </a:xfrm>
+          <a:prstGeom prst="rect">
+            <a:avLst/>
+          </a:prstGeom>
+        </p:spPr>
+      </p:pic>
+      <p:pic>
+        <p:nvPicPr>
+          <p:cNvPr id="3" name="Picture 2" descr="modify_d1_d2_04.png"/>
+          <p:cNvPicPr>
+            <a:picLocks noChangeAspect="1"/>
+          </p:cNvPicPr>
+          <p:nvPr/>
+        </p:nvPicPr>
+        <p:blipFill>
+          <a:blip r:embed="rId3"/>
+          <a:stretch>
+            <a:fillRect/>
+          </a:stretch>
+        </p:blipFill>
+        <p:spPr>
+          <a:xfrm>
+            <a:off x="402336" y="3657600"/>
+            <a:ext cx="5486400" cy="3200400"/>
+          </a:xfrm>
+          <a:prstGeom prst="rect">
+            <a:avLst/>
+          </a:prstGeom>
+        </p:spPr>
+      </p:pic>
+      <p:pic>
+        <p:nvPicPr>
+          <p:cNvPr id="4" name="Picture 3" descr="modify_d1_d2_15.png"/>
+          <p:cNvPicPr>
+            <a:picLocks noChangeAspect="1"/>
+          </p:cNvPicPr>
+          <p:nvPr/>
+        </p:nvPicPr>
+        <p:blipFill>
+          <a:blip r:embed="rId4"/>
+          <a:stretch>
+            <a:fillRect/>
+          </a:stretch>
+        </p:blipFill>
+        <p:spPr>
+          <a:xfrm>
+            <a:off x="6300216" y="457200"/>
+            <a:ext cx="5486400" cy="3200400"/>
+          </a:xfrm>
+          <a:prstGeom prst="rect">
+            <a:avLst/>
+          </a:prstGeom>
+        </p:spPr>
+      </p:pic>
+      <p:pic>
+        <p:nvPicPr>
+          <p:cNvPr id="5" name="Picture 4" descr="modify_d1_d2_16.png"/>
+          <p:cNvPicPr>
+            <a:picLocks noChangeAspect="1"/>
+          </p:cNvPicPr>
+          <p:nvPr/>
+        </p:nvPicPr>
+        <p:blipFill>
+          <a:blip r:embed="rId5"/>
+          <a:stretch>
+            <a:fillRect/>
+          </a:stretch>
+        </p:blipFill>
+        <p:spPr>
+          <a:xfrm>
+            <a:off x="6300216" y="3657600"/>
+            <a:ext cx="5486400" cy="3200400"/>
+          </a:xfrm>
+          <a:prstGeom prst="rect">
+            <a:avLst/>
+          </a:prstGeom>
+        </p:spPr>
+      </p:pic>
+      <p:sp>
+        <p:nvSpPr>
+          <p:cNvPr id="6" name="TextBox 5"/>
+          <p:cNvSpPr txBox="1"/>
+          <p:nvPr/>
+        </p:nvSpPr>
+        <p:spPr>
+          <a:xfrm>
+            <a:off x="0" y="0"/>
+            <a:ext cx="12188952" cy="457200"/>
+          </a:xfrm>
+          <a:prstGeom prst="rect">
+            <a:avLst/>
+          </a:prstGeom>
+          <a:noFill/>
+        </p:spPr>
+        <p:txBody>
+          <a:bodyPr wrap="none">
+            <a:spAutoFit/>
+          </a:bodyPr>
+          <a:lstStyle/>
+          <a:p>
+            <a:pPr algn="ctr"/>
+            <a:r>
+              <a:rPr sz="2400" b="1"/>
+              <a:t>fit1p.mps</a:t>
+            </a:r>
+          </a:p>
+        </p:txBody>
+      </p:sp>
+    </p:spTree>
+  </p:cSld>
+  <p:clrMapOvr>
+    <a:masterClrMapping/>
+  </p:clrMapOvr>
+</p:sld>
+</file>
+
+<file path=ppt/slides/slide7.xml><?xml version="1.0" encoding="utf-8"?>
+<p:sld xmlns:a="http://schemas.openxmlformats.org/drawingml/2006/main" xmlns:p="http://schemas.openxmlformats.org/presentationml/2006/main" xmlns:r="http://schemas.openxmlformats.org/officeDocument/2006/relationships">
+  <p:cSld>
+    <p:spTree>
+      <p:nvGrpSpPr>
+        <p:cNvPr id="1" name=""/>
+        <p:cNvGrpSpPr/>
+        <p:nvPr/>
+      </p:nvGrpSpPr>
+      <p:grpSpPr/>
+      <p:pic>
+        <p:nvPicPr>
+          <p:cNvPr id="2" name="Picture 1" descr="modify_d1_d2_02.png"/>
+          <p:cNvPicPr>
+            <a:picLocks noChangeAspect="1"/>
+          </p:cNvPicPr>
+          <p:nvPr/>
+        </p:nvPicPr>
+        <p:blipFill>
+          <a:blip r:embed="rId2"/>
+          <a:stretch>
+            <a:fillRect/>
+          </a:stretch>
+        </p:blipFill>
+        <p:spPr>
+          <a:xfrm>
+            <a:off x="402336" y="457200"/>
+            <a:ext cx="5486400" cy="3200400"/>
+          </a:xfrm>
+          <a:prstGeom prst="rect">
+            <a:avLst/>
+          </a:prstGeom>
+        </p:spPr>
+      </p:pic>
+      <p:pic>
+        <p:nvPicPr>
+          <p:cNvPr id="3" name="Picture 2" descr="modify_d1_d2_01.png"/>
+          <p:cNvPicPr>
+            <a:picLocks noChangeAspect="1"/>
+          </p:cNvPicPr>
+          <p:nvPr/>
+        </p:nvPicPr>
+        <p:blipFill>
+          <a:blip r:embed="rId3"/>
+          <a:stretch>
+            <a:fillRect/>
+          </a:stretch>
+        </p:blipFill>
+        <p:spPr>
+          <a:xfrm>
+            <a:off x="402336" y="3657600"/>
+            <a:ext cx="5486400" cy="3200400"/>
+          </a:xfrm>
+          <a:prstGeom prst="rect">
+            <a:avLst/>
+          </a:prstGeom>
+        </p:spPr>
+      </p:pic>
+      <p:pic>
+        <p:nvPicPr>
+          <p:cNvPr id="4" name="Picture 3" descr="modify_d1_d2_18.png"/>
+          <p:cNvPicPr>
+            <a:picLocks noChangeAspect="1"/>
+          </p:cNvPicPr>
+          <p:nvPr/>
+        </p:nvPicPr>
+        <p:blipFill>
+          <a:blip r:embed="rId4"/>
+          <a:stretch>
+            <a:fillRect/>
+          </a:stretch>
+        </p:blipFill>
+        <p:spPr>
+          <a:xfrm>
+            <a:off x="6300216" y="457200"/>
+            <a:ext cx="5486400" cy="3200400"/>
+          </a:xfrm>
+          <a:prstGeom prst="rect">
+            <a:avLst/>
+          </a:prstGeom>
+        </p:spPr>
+      </p:pic>
+      <p:pic>
+        <p:nvPicPr>
+          <p:cNvPr id="5" name="Picture 4" descr="modify_d1_d2_17.png"/>
+          <p:cNvPicPr>
+            <a:picLocks noChangeAspect="1"/>
+          </p:cNvPicPr>
+          <p:nvPr/>
+        </p:nvPicPr>
+        <p:blipFill>
+          <a:blip r:embed="rId5"/>
+          <a:stretch>
+            <a:fillRect/>
+          </a:stretch>
+        </p:blipFill>
+        <p:spPr>
+          <a:xfrm>
+            <a:off x="6300216" y="3657600"/>
+            <a:ext cx="5486400" cy="3200400"/>
+          </a:xfrm>
+          <a:prstGeom prst="rect">
+            <a:avLst/>
+          </a:prstGeom>
+        </p:spPr>
+      </p:pic>
+      <p:sp>
+        <p:nvSpPr>
+          <p:cNvPr id="6" name="TextBox 5"/>
+          <p:cNvSpPr txBox="1"/>
+          <p:nvPr/>
+        </p:nvSpPr>
+        <p:spPr>
+          <a:xfrm>
+            <a:off x="0" y="0"/>
+            <a:ext cx="12188952" cy="457200"/>
+          </a:xfrm>
+          <a:prstGeom prst="rect">
+            <a:avLst/>
+          </a:prstGeom>
+          <a:noFill/>
+        </p:spPr>
+        <p:txBody>
+          <a:bodyPr wrap="none">
+            <a:spAutoFit/>
+          </a:bodyPr>
+          <a:lstStyle/>
+          <a:p>
+            <a:pPr algn="ctr"/>
+            <a:r>
+              <a:rPr sz="2400" b="1"/>
+              <a:t>fit1p.mps</a:t>
+            </a:r>
+          </a:p>
+        </p:txBody>
+      </p:sp>
+    </p:spTree>
+  </p:cSld>
+  <p:clrMapOvr>
+    <a:masterClrMapping/>
+  </p:clrMapOvr>
+</p:sld>
+</file>
+
+<file path=ppt/slides/slide8.xml><?xml version="1.0" encoding="utf-8"?>
+<p:sld xmlns:a="http://schemas.openxmlformats.org/drawingml/2006/main" xmlns:p="http://schemas.openxmlformats.org/presentationml/2006/main" xmlns:r="http://schemas.openxmlformats.org/officeDocument/2006/relationships">
+  <p:cSld>
+    <p:spTree>
+      <p:nvGrpSpPr>
+        <p:cNvPr id="1" name=""/>
+        <p:cNvGrpSpPr/>
+        <p:nvPr/>
+      </p:nvGrpSpPr>
+      <p:grpSpPr/>
+      <p:pic>
+        <p:nvPicPr>
+          <p:cNvPr id="2" name="Picture 1" descr="modify_d1_d2_03.png"/>
+          <p:cNvPicPr>
+            <a:picLocks noChangeAspect="1"/>
+          </p:cNvPicPr>
+          <p:nvPr/>
+        </p:nvPicPr>
+        <p:blipFill>
+          <a:blip r:embed="rId2"/>
+          <a:stretch>
+            <a:fillRect/>
+          </a:stretch>
+        </p:blipFill>
+        <p:spPr>
+          <a:xfrm>
+            <a:off x="402336" y="457200"/>
+            <a:ext cx="5486400" cy="3200400"/>
+          </a:xfrm>
+          <a:prstGeom prst="rect">
+            <a:avLst/>
+          </a:prstGeom>
+        </p:spPr>
+      </p:pic>
+      <p:pic>
+        <p:nvPicPr>
+          <p:cNvPr id="3" name="Picture 2" descr="modify_d1_d2_04.png"/>
+          <p:cNvPicPr>
+            <a:picLocks noChangeAspect="1"/>
+          </p:cNvPicPr>
+          <p:nvPr/>
+        </p:nvPicPr>
+        <p:blipFill>
+          <a:blip r:embed="rId3"/>
+          <a:stretch>
+            <a:fillRect/>
+          </a:stretch>
+        </p:blipFill>
+        <p:spPr>
+          <a:xfrm>
+            <a:off x="402336" y="3657600"/>
+            <a:ext cx="5486400" cy="3200400"/>
+          </a:xfrm>
+          <a:prstGeom prst="rect">
+            <a:avLst/>
+          </a:prstGeom>
+        </p:spPr>
+      </p:pic>
+      <p:pic>
+        <p:nvPicPr>
+          <p:cNvPr id="4" name="Picture 3" descr="modify_d1_d2_19.png"/>
+          <p:cNvPicPr>
+            <a:picLocks noChangeAspect="1"/>
+          </p:cNvPicPr>
+          <p:nvPr/>
+        </p:nvPicPr>
+        <p:blipFill>
+          <a:blip r:embed="rId4"/>
+          <a:stretch>
+            <a:fillRect/>
+          </a:stretch>
+        </p:blipFill>
+        <p:spPr>
+          <a:xfrm>
+            <a:off x="6300216" y="457200"/>
+            <a:ext cx="5486400" cy="3200400"/>
+          </a:xfrm>
+          <a:prstGeom prst="rect">
+            <a:avLst/>
+          </a:prstGeom>
+        </p:spPr>
+      </p:pic>
+      <p:pic>
+        <p:nvPicPr>
+          <p:cNvPr id="5" name="Picture 4" descr="modify_d1_d2_20.png"/>
+          <p:cNvPicPr>
+            <a:picLocks noChangeAspect="1"/>
+          </p:cNvPicPr>
+          <p:nvPr/>
+        </p:nvPicPr>
+        <p:blipFill>
+          <a:blip r:embed="rId5"/>
+          <a:stretch>
+            <a:fillRect/>
+          </a:stretch>
+        </p:blipFill>
+        <p:spPr>
+          <a:xfrm>
+            <a:off x="6300216" y="3657600"/>
+            <a:ext cx="5486400" cy="3200400"/>
+          </a:xfrm>
+          <a:prstGeom prst="rect">
+            <a:avLst/>
+          </a:prstGeom>
+        </p:spPr>
+      </p:pic>
+      <p:sp>
+        <p:nvSpPr>
+          <p:cNvPr id="6" name="TextBox 5"/>
+          <p:cNvSpPr txBox="1"/>
+          <p:nvPr/>
+        </p:nvSpPr>
+        <p:spPr>
+          <a:xfrm>
+            <a:off x="0" y="0"/>
+            <a:ext cx="12188952" cy="457200"/>
+          </a:xfrm>
+          <a:prstGeom prst="rect">
+            <a:avLst/>
+          </a:prstGeom>
+          <a:noFill/>
+        </p:spPr>
+        <p:txBody>
+          <a:bodyPr wrap="none">
+            <a:spAutoFit/>
+          </a:bodyPr>
+          <a:lstStyle/>
+          <a:p>
+            <a:pPr algn="ctr"/>
+            <a:r>
+              <a:rPr sz="2400" b="1"/>
+              <a:t>fit1p.mps</a:t>
+            </a:r>
+          </a:p>
+        </p:txBody>
+      </p:sp>
+    </p:spTree>
+  </p:cSld>
+  <p:clrMapOvr>
+    <a:masterClrMapping/>
+  </p:clrMapOvr>
+</p:sld>
+</file>
+
+<file path=ppt/slides/slide9.xml><?xml version="1.0" encoding="utf-8"?>
+<p:sld xmlns:a="http://schemas.openxmlformats.org/drawingml/2006/main" xmlns:p="http://schemas.openxmlformats.org/presentationml/2006/main" xmlns:r="http://schemas.openxmlformats.org/officeDocument/2006/relationships">
+  <p:cSld>
+    <p:spTree>
+      <p:nvGrpSpPr>
+        <p:cNvPr id="1" name=""/>
+        <p:cNvGrpSpPr/>
+        <p:nvPr/>
+      </p:nvGrpSpPr>
+      <p:grpSpPr/>
+      <p:pic>
+        <p:nvPicPr>
+          <p:cNvPr id="2" name="Picture 1" descr="modify_d1_d2_02.png"/>
+          <p:cNvPicPr>
+            <a:picLocks noChangeAspect="1"/>
+          </p:cNvPicPr>
+          <p:nvPr/>
+        </p:nvPicPr>
+        <p:blipFill>
+          <a:blip r:embed="rId2"/>
+          <a:stretch>
+            <a:fillRect/>
+          </a:stretch>
+        </p:blipFill>
+        <p:spPr>
+          <a:xfrm>
+            <a:off x="402336" y="457200"/>
+            <a:ext cx="5486400" cy="3200400"/>
+          </a:xfrm>
+          <a:prstGeom prst="rect">
+            <a:avLst/>
+          </a:prstGeom>
+        </p:spPr>
+      </p:pic>
+      <p:pic>
+        <p:nvPicPr>
+          <p:cNvPr id="3" name="Picture 2" descr="modify_d1_d2_01.png"/>
+          <p:cNvPicPr>
+            <a:picLocks noChangeAspect="1"/>
+          </p:cNvPicPr>
+          <p:nvPr/>
+        </p:nvPicPr>
+        <p:blipFill>
+          <a:blip r:embed="rId3"/>
+          <a:stretch>
+            <a:fillRect/>
+          </a:stretch>
+        </p:blipFill>
+        <p:spPr>
+          <a:xfrm>
+            <a:off x="402336" y="3657600"/>
+            <a:ext cx="5486400" cy="3200400"/>
+          </a:xfrm>
+          <a:prstGeom prst="rect">
+            <a:avLst/>
+          </a:prstGeom>
+        </p:spPr>
+      </p:pic>
+      <p:pic>
+        <p:nvPicPr>
+          <p:cNvPr id="4" name="Picture 3" descr="modify_d1_d2_22.png"/>
+          <p:cNvPicPr>
+            <a:picLocks noChangeAspect="1"/>
+          </p:cNvPicPr>
+          <p:nvPr/>
+        </p:nvPicPr>
+        <p:blipFill>
+          <a:blip r:embed="rId4"/>
+          <a:stretch>
+            <a:fillRect/>
+          </a:stretch>
+        </p:blipFill>
+        <p:spPr>
+          <a:xfrm>
+            <a:off x="6300216" y="457200"/>
+            <a:ext cx="5486400" cy="3200400"/>
+          </a:xfrm>
+          <a:prstGeom prst="rect">
+            <a:avLst/>
+          </a:prstGeom>
+        </p:spPr>
+      </p:pic>
+      <p:pic>
+        <p:nvPicPr>
+          <p:cNvPr id="5" name="Picture 4" descr="modify_d1_d2_21.png"/>
+          <p:cNvPicPr>
+            <a:picLocks noChangeAspect="1"/>
+          </p:cNvPicPr>
+          <p:nvPr/>
+        </p:nvPicPr>
+        <p:blipFill>
+          <a:blip r:embed="rId5"/>
+          <a:stretch>
+            <a:fillRect/>
+          </a:stretch>
+        </p:blipFill>
+        <p:spPr>
+          <a:xfrm>
+            <a:off x="6300216" y="3657600"/>
+            <a:ext cx="5486400" cy="3200400"/>
+          </a:xfrm>
+          <a:prstGeom prst="rect">
+            <a:avLst/>
+          </a:prstGeom>
+        </p:spPr>
+      </p:pic>
+      <p:sp>
+        <p:nvSpPr>
+          <p:cNvPr id="6" name="TextBox 5"/>
+          <p:cNvSpPr txBox="1"/>
+          <p:nvPr/>
+        </p:nvSpPr>
+        <p:spPr>
+          <a:xfrm>
+            <a:off x="0" y="0"/>
+            <a:ext cx="12188952" cy="457200"/>
+          </a:xfrm>
+          <a:prstGeom prst="rect">
+            <a:avLst/>
+          </a:prstGeom>
+          <a:noFill/>
+        </p:spPr>
+        <p:txBody>
+          <a:bodyPr wrap="none">
+            <a:spAutoFit/>
+          </a:bodyPr>
+          <a:lstStyle/>
+          <a:p>
+            <a:pPr algn="ctr"/>
+            <a:r>
+              <a:rPr sz="2400" b="1"/>
+              <a:t>fit1p.mps</a:t>
+            </a:r>
+          </a:p>
+        </p:txBody>
+      </p:sp>
+    </p:spTree>
   </p:cSld>
   <p:clrMapOvr>
     <a:masterClrMapping/>

</xml_diff>

<commit_message>
Update of show_... functions
Update the title, axis, legends... of the different graphics in the different functions show_...
Update the function show_eigenvalue to add the evolution of the different terms of the bounds.
</commit_message>
<xml_diff>
--- a/Results/Variation_d1-d2/html/results.pptx
+++ b/Results/Variation_d1-d2/html/results.pptx
@@ -5,22 +5,12 @@
     <p:sldMasterId id="2147483648" r:id="rId1"/>
   </p:sldMasterIdLst>
   <p:sldIdLst>
-    <p:sldId id="256" r:id="rId2"/>
-    <p:sldId id="257" r:id="rId7"/>
-    <p:sldId id="258" r:id="rId8"/>
-    <p:sldId id="259" r:id="rId9"/>
-    <p:sldId id="260" r:id="rId10"/>
-    <p:sldId id="261" r:id="rId11"/>
-    <p:sldId id="262" r:id="rId12"/>
-    <p:sldId id="263" r:id="rId13"/>
-    <p:sldId id="264" r:id="rId14"/>
-    <p:sldId id="265" r:id="rId15"/>
-    <p:sldId id="266" r:id="rId16"/>
-    <p:sldId id="267" r:id="rId17"/>
-    <p:sldId id="268" r:id="rId18"/>
-    <p:sldId id="269" r:id="rId19"/>
-    <p:sldId id="270" r:id="rId20"/>
-    <p:sldId id="271" r:id="rId21"/>
+    <p:sldId id="258" r:id="rId2"/>
+    <p:sldId id="259" r:id="rId3"/>
+    <p:sldId id="266" r:id="rId4"/>
+    <p:sldId id="267" r:id="rId5"/>
+    <p:sldId id="270" r:id="rId6"/>
+    <p:sldId id="271" r:id="rId7"/>
   </p:sldIdLst>
   <p:sldSz cx="12192000" cy="6858000"/>
   <p:notesSz cx="6858000" cy="9144000"/>
@@ -276,7 +266,7 @@
           <a:p>
             <a:fld id="{774F7F4D-6CB5-4A06-9CB3-D7756724686F}" type="datetimeFigureOut">
               <a:rPr lang="en-GB" smtClean="0"/>
-              <a:t>22/04/2020</a:t>
+              <a:t>27/04/2020</a:t>
             </a:fld>
             <a:endParaRPr lang="en-GB"/>
           </a:p>
@@ -476,7 +466,7 @@
           <a:p>
             <a:fld id="{774F7F4D-6CB5-4A06-9CB3-D7756724686F}" type="datetimeFigureOut">
               <a:rPr lang="en-GB" smtClean="0"/>
-              <a:t>22/04/2020</a:t>
+              <a:t>27/04/2020</a:t>
             </a:fld>
             <a:endParaRPr lang="en-GB"/>
           </a:p>
@@ -686,7 +676,7 @@
           <a:p>
             <a:fld id="{774F7F4D-6CB5-4A06-9CB3-D7756724686F}" type="datetimeFigureOut">
               <a:rPr lang="en-GB" smtClean="0"/>
-              <a:t>22/04/2020</a:t>
+              <a:t>27/04/2020</a:t>
             </a:fld>
             <a:endParaRPr lang="en-GB"/>
           </a:p>
@@ -886,7 +876,7 @@
           <a:p>
             <a:fld id="{774F7F4D-6CB5-4A06-9CB3-D7756724686F}" type="datetimeFigureOut">
               <a:rPr lang="en-GB" smtClean="0"/>
-              <a:t>22/04/2020</a:t>
+              <a:t>27/04/2020</a:t>
             </a:fld>
             <a:endParaRPr lang="en-GB"/>
           </a:p>
@@ -1162,7 +1152,7 @@
           <a:p>
             <a:fld id="{774F7F4D-6CB5-4A06-9CB3-D7756724686F}" type="datetimeFigureOut">
               <a:rPr lang="en-GB" smtClean="0"/>
-              <a:t>22/04/2020</a:t>
+              <a:t>27/04/2020</a:t>
             </a:fld>
             <a:endParaRPr lang="en-GB"/>
           </a:p>
@@ -1430,7 +1420,7 @@
           <a:p>
             <a:fld id="{774F7F4D-6CB5-4A06-9CB3-D7756724686F}" type="datetimeFigureOut">
               <a:rPr lang="en-GB" smtClean="0"/>
-              <a:t>22/04/2020</a:t>
+              <a:t>27/04/2020</a:t>
             </a:fld>
             <a:endParaRPr lang="en-GB"/>
           </a:p>
@@ -1845,7 +1835,7 @@
           <a:p>
             <a:fld id="{774F7F4D-6CB5-4A06-9CB3-D7756724686F}" type="datetimeFigureOut">
               <a:rPr lang="en-GB" smtClean="0"/>
-              <a:t>22/04/2020</a:t>
+              <a:t>27/04/2020</a:t>
             </a:fld>
             <a:endParaRPr lang="en-GB"/>
           </a:p>
@@ -1987,7 +1977,7 @@
           <a:p>
             <a:fld id="{774F7F4D-6CB5-4A06-9CB3-D7756724686F}" type="datetimeFigureOut">
               <a:rPr lang="en-GB" smtClean="0"/>
-              <a:t>22/04/2020</a:t>
+              <a:t>27/04/2020</a:t>
             </a:fld>
             <a:endParaRPr lang="en-GB"/>
           </a:p>
@@ -2100,7 +2090,7 @@
           <a:p>
             <a:fld id="{774F7F4D-6CB5-4A06-9CB3-D7756724686F}" type="datetimeFigureOut">
               <a:rPr lang="en-GB" smtClean="0"/>
-              <a:t>22/04/2020</a:t>
+              <a:t>27/04/2020</a:t>
             </a:fld>
             <a:endParaRPr lang="en-GB"/>
           </a:p>
@@ -2413,7 +2403,7 @@
           <a:p>
             <a:fld id="{774F7F4D-6CB5-4A06-9CB3-D7756724686F}" type="datetimeFigureOut">
               <a:rPr lang="en-GB" smtClean="0"/>
-              <a:t>22/04/2020</a:t>
+              <a:t>27/04/2020</a:t>
             </a:fld>
             <a:endParaRPr lang="en-GB"/>
           </a:p>
@@ -2702,7 +2692,7 @@
           <a:p>
             <a:fld id="{774F7F4D-6CB5-4A06-9CB3-D7756724686F}" type="datetimeFigureOut">
               <a:rPr lang="en-GB" smtClean="0"/>
-              <a:t>22/04/2020</a:t>
+              <a:t>27/04/2020</a:t>
             </a:fld>
             <a:endParaRPr lang="en-GB"/>
           </a:p>
@@ -2945,7 +2935,7 @@
           <a:p>
             <a:fld id="{774F7F4D-6CB5-4A06-9CB3-D7756724686F}" type="datetimeFigureOut">
               <a:rPr lang="en-GB" smtClean="0"/>
-              <a:t>22/04/2020</a:t>
+              <a:t>27/04/2020</a:t>
             </a:fld>
             <a:endParaRPr lang="en-GB"/>
           </a:p>
@@ -3412,7 +3402,7 @@
       </p:pic>
       <p:pic>
         <p:nvPicPr>
-          <p:cNvPr id="4" name="Picture 3" descr="modify_d1_d2_06.png"/>
+          <p:cNvPr id="4" name="Picture 3" descr="modify_d1_d2_10.png"/>
           <p:cNvPicPr>
             <a:picLocks noChangeAspect="1"/>
           </p:cNvPicPr>
@@ -3436,7 +3426,7 @@
       </p:pic>
       <p:pic>
         <p:nvPicPr>
-          <p:cNvPr id="5" name="Picture 4" descr="modify_d1_d2_05.png"/>
+          <p:cNvPr id="5" name="Picture 4" descr="modify_d1_d2_09.png"/>
           <p:cNvPicPr>
             <a:picLocks noChangeAspect="1"/>
           </p:cNvPicPr>
@@ -3489,11 +3479,6 @@
         </p:txBody>
       </p:sp>
     </p:spTree>
-    <p:extLst>
-      <p:ext uri="{BB962C8B-B14F-4D97-AF65-F5344CB8AC3E}">
-        <p14:creationId xmlns:p14="http://schemas.microsoft.com/office/powerpoint/2010/main" val="132759147"/>
-      </p:ext>
-    </p:extLst>
   </p:cSld>
   <p:clrMapOvr>
     <a:masterClrMapping/>
@@ -3501,8 +3486,8 @@
 </p:sld>
 </file>
 
-<file path=ppt/slides/slide10.xml><?xml version="1.0" encoding="utf-8"?>
-<p:sld xmlns:a="http://schemas.openxmlformats.org/drawingml/2006/main" xmlns:p="http://schemas.openxmlformats.org/presentationml/2006/main" xmlns:r="http://schemas.openxmlformats.org/officeDocument/2006/relationships">
+<file path=ppt/slides/slide2.xml><?xml version="1.0" encoding="utf-8"?>
+<p:sld xmlns:a="http://schemas.openxmlformats.org/drawingml/2006/main" xmlns:r="http://schemas.openxmlformats.org/officeDocument/2006/relationships" xmlns:p="http://schemas.openxmlformats.org/presentationml/2006/main">
   <p:cSld>
     <p:spTree>
       <p:nvGrpSpPr>
@@ -3510,7 +3495,14 @@
         <p:cNvGrpSpPr/>
         <p:nvPr/>
       </p:nvGrpSpPr>
-      <p:grpSpPr/>
+      <p:grpSpPr>
+        <a:xfrm>
+          <a:off x="0" y="0"/>
+          <a:ext cx="0" cy="0"/>
+          <a:chOff x="0" y="0"/>
+          <a:chExt cx="0" cy="0"/>
+        </a:xfrm>
+      </p:grpSpPr>
       <p:pic>
         <p:nvPicPr>
           <p:cNvPr id="2" name="Picture 1" descr="modify_d1_d2_03.png"/>
@@ -3561,7 +3553,7 @@
       </p:pic>
       <p:pic>
         <p:nvPicPr>
-          <p:cNvPr id="4" name="Picture 3" descr="modify_d1_d2_23.png"/>
+          <p:cNvPr id="4" name="Picture 3" descr="modify_d1_d2_11.png"/>
           <p:cNvPicPr>
             <a:picLocks noChangeAspect="1"/>
           </p:cNvPicPr>
@@ -3585,7 +3577,7 @@
       </p:pic>
       <p:pic>
         <p:nvPicPr>
-          <p:cNvPr id="5" name="Picture 4" descr="modify_d1_d2_24.png"/>
+          <p:cNvPr id="5" name="Picture 4" descr="modify_d1_d2_12.png"/>
           <p:cNvPicPr>
             <a:picLocks noChangeAspect="1"/>
           </p:cNvPicPr>
@@ -3645,8 +3637,8 @@
 </p:sld>
 </file>
 
-<file path=ppt/slides/slide11.xml><?xml version="1.0" encoding="utf-8"?>
-<p:sld xmlns:a="http://schemas.openxmlformats.org/drawingml/2006/main" xmlns:p="http://schemas.openxmlformats.org/presentationml/2006/main" xmlns:r="http://schemas.openxmlformats.org/officeDocument/2006/relationships">
+<file path=ppt/slides/slide3.xml><?xml version="1.0" encoding="utf-8"?>
+<p:sld xmlns:a="http://schemas.openxmlformats.org/drawingml/2006/main" xmlns:r="http://schemas.openxmlformats.org/officeDocument/2006/relationships" xmlns:p="http://schemas.openxmlformats.org/presentationml/2006/main">
   <p:cSld>
     <p:spTree>
       <p:nvGrpSpPr>
@@ -3654,7 +3646,14 @@
         <p:cNvGrpSpPr/>
         <p:nvPr/>
       </p:nvGrpSpPr>
-      <p:grpSpPr/>
+      <p:grpSpPr>
+        <a:xfrm>
+          <a:off x="0" y="0"/>
+          <a:ext cx="0" cy="0"/>
+          <a:chOff x="0" y="0"/>
+          <a:chExt cx="0" cy="0"/>
+        </a:xfrm>
+      </p:grpSpPr>
       <p:pic>
         <p:nvPicPr>
           <p:cNvPr id="2" name="Picture 1" descr="modify_d1_d2_02.png"/>
@@ -3789,8 +3788,8 @@
 </p:sld>
 </file>
 
-<file path=ppt/slides/slide12.xml><?xml version="1.0" encoding="utf-8"?>
-<p:sld xmlns:a="http://schemas.openxmlformats.org/drawingml/2006/main" xmlns:p="http://schemas.openxmlformats.org/presentationml/2006/main" xmlns:r="http://schemas.openxmlformats.org/officeDocument/2006/relationships">
+<file path=ppt/slides/slide4.xml><?xml version="1.0" encoding="utf-8"?>
+<p:sld xmlns:a="http://schemas.openxmlformats.org/drawingml/2006/main" xmlns:r="http://schemas.openxmlformats.org/officeDocument/2006/relationships" xmlns:p="http://schemas.openxmlformats.org/presentationml/2006/main">
   <p:cSld>
     <p:spTree>
       <p:nvGrpSpPr>
@@ -3798,7 +3797,14 @@
         <p:cNvGrpSpPr/>
         <p:nvPr/>
       </p:nvGrpSpPr>
-      <p:grpSpPr/>
+      <p:grpSpPr>
+        <a:xfrm>
+          <a:off x="0" y="0"/>
+          <a:ext cx="0" cy="0"/>
+          <a:chOff x="0" y="0"/>
+          <a:chExt cx="0" cy="0"/>
+        </a:xfrm>
+      </p:grpSpPr>
       <p:pic>
         <p:nvPicPr>
           <p:cNvPr id="2" name="Picture 1" descr="modify_d1_d2_03.png"/>
@@ -3933,8 +3939,8 @@
 </p:sld>
 </file>
 
-<file path=ppt/slides/slide13.xml><?xml version="1.0" encoding="utf-8"?>
-<p:sld xmlns:a="http://schemas.openxmlformats.org/drawingml/2006/main" xmlns:p="http://schemas.openxmlformats.org/presentationml/2006/main" xmlns:r="http://schemas.openxmlformats.org/officeDocument/2006/relationships">
+<file path=ppt/slides/slide5.xml><?xml version="1.0" encoding="utf-8"?>
+<p:sld xmlns:a="http://schemas.openxmlformats.org/drawingml/2006/main" xmlns:r="http://schemas.openxmlformats.org/officeDocument/2006/relationships" xmlns:p="http://schemas.openxmlformats.org/presentationml/2006/main">
   <p:cSld>
     <p:spTree>
       <p:nvGrpSpPr>
@@ -3942,7 +3948,14 @@
         <p:cNvGrpSpPr/>
         <p:nvPr/>
       </p:nvGrpSpPr>
-      <p:grpSpPr/>
+      <p:grpSpPr>
+        <a:xfrm>
+          <a:off x="0" y="0"/>
+          <a:ext cx="0" cy="0"/>
+          <a:chOff x="0" y="0"/>
+          <a:chExt cx="0" cy="0"/>
+        </a:xfrm>
+      </p:grpSpPr>
       <p:pic>
         <p:nvPicPr>
           <p:cNvPr id="2" name="Picture 1" descr="modify_d1_d2_02.png"/>
@@ -3993,7 +4006,7 @@
       </p:pic>
       <p:pic>
         <p:nvPicPr>
-          <p:cNvPr id="4" name="Picture 3" descr="modify_d1_d2_30.png"/>
+          <p:cNvPr id="4" name="Picture 3" descr="modify_d1_d2_34.png"/>
           <p:cNvPicPr>
             <a:picLocks noChangeAspect="1"/>
           </p:cNvPicPr>
@@ -4017,7 +4030,7 @@
       </p:pic>
       <p:pic>
         <p:nvPicPr>
-          <p:cNvPr id="5" name="Picture 4" descr="modify_d1_d2_29.png"/>
+          <p:cNvPr id="5" name="Picture 4" descr="modify_d1_d2_33.png"/>
           <p:cNvPicPr>
             <a:picLocks noChangeAspect="1"/>
           </p:cNvPicPr>
@@ -4077,8 +4090,8 @@
 </p:sld>
 </file>
 
-<file path=ppt/slides/slide14.xml><?xml version="1.0" encoding="utf-8"?>
-<p:sld xmlns:a="http://schemas.openxmlformats.org/drawingml/2006/main" xmlns:p="http://schemas.openxmlformats.org/presentationml/2006/main" xmlns:r="http://schemas.openxmlformats.org/officeDocument/2006/relationships">
+<file path=ppt/slides/slide6.xml><?xml version="1.0" encoding="utf-8"?>
+<p:sld xmlns:a="http://schemas.openxmlformats.org/drawingml/2006/main" xmlns:r="http://schemas.openxmlformats.org/officeDocument/2006/relationships" xmlns:p="http://schemas.openxmlformats.org/presentationml/2006/main">
   <p:cSld>
     <p:spTree>
       <p:nvGrpSpPr>
@@ -4086,7 +4099,14 @@
         <p:cNvGrpSpPr/>
         <p:nvPr/>
       </p:nvGrpSpPr>
-      <p:grpSpPr/>
+      <p:grpSpPr>
+        <a:xfrm>
+          <a:off x="0" y="0"/>
+          <a:ext cx="0" cy="0"/>
+          <a:chOff x="0" y="0"/>
+          <a:chExt cx="0" cy="0"/>
+        </a:xfrm>
+      </p:grpSpPr>
       <p:pic>
         <p:nvPicPr>
           <p:cNvPr id="2" name="Picture 1" descr="modify_d1_d2_03.png"/>
@@ -4137,294 +4157,6 @@
       </p:pic>
       <p:pic>
         <p:nvPicPr>
-          <p:cNvPr id="4" name="Picture 3" descr="modify_d1_d2_31.png"/>
-          <p:cNvPicPr>
-            <a:picLocks noChangeAspect="1"/>
-          </p:cNvPicPr>
-          <p:nvPr/>
-        </p:nvPicPr>
-        <p:blipFill>
-          <a:blip r:embed="rId4"/>
-          <a:stretch>
-            <a:fillRect/>
-          </a:stretch>
-        </p:blipFill>
-        <p:spPr>
-          <a:xfrm>
-            <a:off x="6300216" y="457200"/>
-            <a:ext cx="5486400" cy="3200400"/>
-          </a:xfrm>
-          <a:prstGeom prst="rect">
-            <a:avLst/>
-          </a:prstGeom>
-        </p:spPr>
-      </p:pic>
-      <p:pic>
-        <p:nvPicPr>
-          <p:cNvPr id="5" name="Picture 4" descr="modify_d1_d2_32.png"/>
-          <p:cNvPicPr>
-            <a:picLocks noChangeAspect="1"/>
-          </p:cNvPicPr>
-          <p:nvPr/>
-        </p:nvPicPr>
-        <p:blipFill>
-          <a:blip r:embed="rId5"/>
-          <a:stretch>
-            <a:fillRect/>
-          </a:stretch>
-        </p:blipFill>
-        <p:spPr>
-          <a:xfrm>
-            <a:off x="6300216" y="3657600"/>
-            <a:ext cx="5486400" cy="3200400"/>
-          </a:xfrm>
-          <a:prstGeom prst="rect">
-            <a:avLst/>
-          </a:prstGeom>
-        </p:spPr>
-      </p:pic>
-      <p:sp>
-        <p:nvSpPr>
-          <p:cNvPr id="6" name="TextBox 5"/>
-          <p:cNvSpPr txBox="1"/>
-          <p:nvPr/>
-        </p:nvSpPr>
-        <p:spPr>
-          <a:xfrm>
-            <a:off x="0" y="0"/>
-            <a:ext cx="12188952" cy="457200"/>
-          </a:xfrm>
-          <a:prstGeom prst="rect">
-            <a:avLst/>
-          </a:prstGeom>
-          <a:noFill/>
-        </p:spPr>
-        <p:txBody>
-          <a:bodyPr wrap="none">
-            <a:spAutoFit/>
-          </a:bodyPr>
-          <a:lstStyle/>
-          <a:p>
-            <a:pPr algn="ctr"/>
-            <a:r>
-              <a:rPr sz="2400" b="1"/>
-              <a:t>fit1p.mps</a:t>
-            </a:r>
-          </a:p>
-        </p:txBody>
-      </p:sp>
-    </p:spTree>
-  </p:cSld>
-  <p:clrMapOvr>
-    <a:masterClrMapping/>
-  </p:clrMapOvr>
-</p:sld>
-</file>
-
-<file path=ppt/slides/slide15.xml><?xml version="1.0" encoding="utf-8"?>
-<p:sld xmlns:a="http://schemas.openxmlformats.org/drawingml/2006/main" xmlns:p="http://schemas.openxmlformats.org/presentationml/2006/main" xmlns:r="http://schemas.openxmlformats.org/officeDocument/2006/relationships">
-  <p:cSld>
-    <p:spTree>
-      <p:nvGrpSpPr>
-        <p:cNvPr id="1" name=""/>
-        <p:cNvGrpSpPr/>
-        <p:nvPr/>
-      </p:nvGrpSpPr>
-      <p:grpSpPr/>
-      <p:pic>
-        <p:nvPicPr>
-          <p:cNvPr id="2" name="Picture 1" descr="modify_d1_d2_02.png"/>
-          <p:cNvPicPr>
-            <a:picLocks noChangeAspect="1"/>
-          </p:cNvPicPr>
-          <p:nvPr/>
-        </p:nvPicPr>
-        <p:blipFill>
-          <a:blip r:embed="rId2"/>
-          <a:stretch>
-            <a:fillRect/>
-          </a:stretch>
-        </p:blipFill>
-        <p:spPr>
-          <a:xfrm>
-            <a:off x="402336" y="457200"/>
-            <a:ext cx="5486400" cy="3200400"/>
-          </a:xfrm>
-          <a:prstGeom prst="rect">
-            <a:avLst/>
-          </a:prstGeom>
-        </p:spPr>
-      </p:pic>
-      <p:pic>
-        <p:nvPicPr>
-          <p:cNvPr id="3" name="Picture 2" descr="modify_d1_d2_01.png"/>
-          <p:cNvPicPr>
-            <a:picLocks noChangeAspect="1"/>
-          </p:cNvPicPr>
-          <p:nvPr/>
-        </p:nvPicPr>
-        <p:blipFill>
-          <a:blip r:embed="rId3"/>
-          <a:stretch>
-            <a:fillRect/>
-          </a:stretch>
-        </p:blipFill>
-        <p:spPr>
-          <a:xfrm>
-            <a:off x="402336" y="3657600"/>
-            <a:ext cx="5486400" cy="3200400"/>
-          </a:xfrm>
-          <a:prstGeom prst="rect">
-            <a:avLst/>
-          </a:prstGeom>
-        </p:spPr>
-      </p:pic>
-      <p:pic>
-        <p:nvPicPr>
-          <p:cNvPr id="4" name="Picture 3" descr="modify_d1_d2_34.png"/>
-          <p:cNvPicPr>
-            <a:picLocks noChangeAspect="1"/>
-          </p:cNvPicPr>
-          <p:nvPr/>
-        </p:nvPicPr>
-        <p:blipFill>
-          <a:blip r:embed="rId4"/>
-          <a:stretch>
-            <a:fillRect/>
-          </a:stretch>
-        </p:blipFill>
-        <p:spPr>
-          <a:xfrm>
-            <a:off x="6300216" y="457200"/>
-            <a:ext cx="5486400" cy="3200400"/>
-          </a:xfrm>
-          <a:prstGeom prst="rect">
-            <a:avLst/>
-          </a:prstGeom>
-        </p:spPr>
-      </p:pic>
-      <p:pic>
-        <p:nvPicPr>
-          <p:cNvPr id="5" name="Picture 4" descr="modify_d1_d2_33.png"/>
-          <p:cNvPicPr>
-            <a:picLocks noChangeAspect="1"/>
-          </p:cNvPicPr>
-          <p:nvPr/>
-        </p:nvPicPr>
-        <p:blipFill>
-          <a:blip r:embed="rId5"/>
-          <a:stretch>
-            <a:fillRect/>
-          </a:stretch>
-        </p:blipFill>
-        <p:spPr>
-          <a:xfrm>
-            <a:off x="6300216" y="3657600"/>
-            <a:ext cx="5486400" cy="3200400"/>
-          </a:xfrm>
-          <a:prstGeom prst="rect">
-            <a:avLst/>
-          </a:prstGeom>
-        </p:spPr>
-      </p:pic>
-      <p:sp>
-        <p:nvSpPr>
-          <p:cNvPr id="6" name="TextBox 5"/>
-          <p:cNvSpPr txBox="1"/>
-          <p:nvPr/>
-        </p:nvSpPr>
-        <p:spPr>
-          <a:xfrm>
-            <a:off x="0" y="0"/>
-            <a:ext cx="12188952" cy="457200"/>
-          </a:xfrm>
-          <a:prstGeom prst="rect">
-            <a:avLst/>
-          </a:prstGeom>
-          <a:noFill/>
-        </p:spPr>
-        <p:txBody>
-          <a:bodyPr wrap="none">
-            <a:spAutoFit/>
-          </a:bodyPr>
-          <a:lstStyle/>
-          <a:p>
-            <a:pPr algn="ctr"/>
-            <a:r>
-              <a:rPr sz="2400" b="1"/>
-              <a:t>fit1p.mps</a:t>
-            </a:r>
-          </a:p>
-        </p:txBody>
-      </p:sp>
-    </p:spTree>
-  </p:cSld>
-  <p:clrMapOvr>
-    <a:masterClrMapping/>
-  </p:clrMapOvr>
-</p:sld>
-</file>
-
-<file path=ppt/slides/slide16.xml><?xml version="1.0" encoding="utf-8"?>
-<p:sld xmlns:a="http://schemas.openxmlformats.org/drawingml/2006/main" xmlns:p="http://schemas.openxmlformats.org/presentationml/2006/main" xmlns:r="http://schemas.openxmlformats.org/officeDocument/2006/relationships">
-  <p:cSld>
-    <p:spTree>
-      <p:nvGrpSpPr>
-        <p:cNvPr id="1" name=""/>
-        <p:cNvGrpSpPr/>
-        <p:nvPr/>
-      </p:nvGrpSpPr>
-      <p:grpSpPr/>
-      <p:pic>
-        <p:nvPicPr>
-          <p:cNvPr id="2" name="Picture 1" descr="modify_d1_d2_03.png"/>
-          <p:cNvPicPr>
-            <a:picLocks noChangeAspect="1"/>
-          </p:cNvPicPr>
-          <p:nvPr/>
-        </p:nvPicPr>
-        <p:blipFill>
-          <a:blip r:embed="rId2"/>
-          <a:stretch>
-            <a:fillRect/>
-          </a:stretch>
-        </p:blipFill>
-        <p:spPr>
-          <a:xfrm>
-            <a:off x="402336" y="457200"/>
-            <a:ext cx="5486400" cy="3200400"/>
-          </a:xfrm>
-          <a:prstGeom prst="rect">
-            <a:avLst/>
-          </a:prstGeom>
-        </p:spPr>
-      </p:pic>
-      <p:pic>
-        <p:nvPicPr>
-          <p:cNvPr id="3" name="Picture 2" descr="modify_d1_d2_04.png"/>
-          <p:cNvPicPr>
-            <a:picLocks noChangeAspect="1"/>
-          </p:cNvPicPr>
-          <p:nvPr/>
-        </p:nvPicPr>
-        <p:blipFill>
-          <a:blip r:embed="rId3"/>
-          <a:stretch>
-            <a:fillRect/>
-          </a:stretch>
-        </p:blipFill>
-        <p:spPr>
-          <a:xfrm>
-            <a:off x="402336" y="3657600"/>
-            <a:ext cx="5486400" cy="3200400"/>
-          </a:xfrm>
-          <a:prstGeom prst="rect">
-            <a:avLst/>
-          </a:prstGeom>
-        </p:spPr>
-      </p:pic>
-      <p:pic>
-        <p:nvPicPr>
           <p:cNvPr id="4" name="Picture 3" descr="modify_d1_d2_35.png"/>
           <p:cNvPicPr>
             <a:picLocks noChangeAspect="1"/>
@@ -4450,1158 +4182,6 @@
       <p:pic>
         <p:nvPicPr>
           <p:cNvPr id="5" name="Picture 4" descr="modify_d1_d2_36.png"/>
-          <p:cNvPicPr>
-            <a:picLocks noChangeAspect="1"/>
-          </p:cNvPicPr>
-          <p:nvPr/>
-        </p:nvPicPr>
-        <p:blipFill>
-          <a:blip r:embed="rId5"/>
-          <a:stretch>
-            <a:fillRect/>
-          </a:stretch>
-        </p:blipFill>
-        <p:spPr>
-          <a:xfrm>
-            <a:off x="6300216" y="3657600"/>
-            <a:ext cx="5486400" cy="3200400"/>
-          </a:xfrm>
-          <a:prstGeom prst="rect">
-            <a:avLst/>
-          </a:prstGeom>
-        </p:spPr>
-      </p:pic>
-      <p:sp>
-        <p:nvSpPr>
-          <p:cNvPr id="6" name="TextBox 5"/>
-          <p:cNvSpPr txBox="1"/>
-          <p:nvPr/>
-        </p:nvSpPr>
-        <p:spPr>
-          <a:xfrm>
-            <a:off x="0" y="0"/>
-            <a:ext cx="12188952" cy="457200"/>
-          </a:xfrm>
-          <a:prstGeom prst="rect">
-            <a:avLst/>
-          </a:prstGeom>
-          <a:noFill/>
-        </p:spPr>
-        <p:txBody>
-          <a:bodyPr wrap="none">
-            <a:spAutoFit/>
-          </a:bodyPr>
-          <a:lstStyle/>
-          <a:p>
-            <a:pPr algn="ctr"/>
-            <a:r>
-              <a:rPr sz="2400" b="1"/>
-              <a:t>fit1p.mps</a:t>
-            </a:r>
-          </a:p>
-        </p:txBody>
-      </p:sp>
-    </p:spTree>
-  </p:cSld>
-  <p:clrMapOvr>
-    <a:masterClrMapping/>
-  </p:clrMapOvr>
-</p:sld>
-</file>
-
-<file path=ppt/slides/slide2.xml><?xml version="1.0" encoding="utf-8"?>
-<p:sld xmlns:a="http://schemas.openxmlformats.org/drawingml/2006/main" xmlns:p="http://schemas.openxmlformats.org/presentationml/2006/main" xmlns:r="http://schemas.openxmlformats.org/officeDocument/2006/relationships">
-  <p:cSld>
-    <p:spTree>
-      <p:nvGrpSpPr>
-        <p:cNvPr id="1" name=""/>
-        <p:cNvGrpSpPr/>
-        <p:nvPr/>
-      </p:nvGrpSpPr>
-      <p:grpSpPr/>
-      <p:pic>
-        <p:nvPicPr>
-          <p:cNvPr id="2" name="Picture 1" descr="modify_d1_d2_03.png"/>
-          <p:cNvPicPr>
-            <a:picLocks noChangeAspect="1"/>
-          </p:cNvPicPr>
-          <p:nvPr/>
-        </p:nvPicPr>
-        <p:blipFill>
-          <a:blip r:embed="rId2"/>
-          <a:stretch>
-            <a:fillRect/>
-          </a:stretch>
-        </p:blipFill>
-        <p:spPr>
-          <a:xfrm>
-            <a:off x="402336" y="457200"/>
-            <a:ext cx="5486400" cy="3200400"/>
-          </a:xfrm>
-          <a:prstGeom prst="rect">
-            <a:avLst/>
-          </a:prstGeom>
-        </p:spPr>
-      </p:pic>
-      <p:pic>
-        <p:nvPicPr>
-          <p:cNvPr id="3" name="Picture 2" descr="modify_d1_d2_04.png"/>
-          <p:cNvPicPr>
-            <a:picLocks noChangeAspect="1"/>
-          </p:cNvPicPr>
-          <p:nvPr/>
-        </p:nvPicPr>
-        <p:blipFill>
-          <a:blip r:embed="rId3"/>
-          <a:stretch>
-            <a:fillRect/>
-          </a:stretch>
-        </p:blipFill>
-        <p:spPr>
-          <a:xfrm>
-            <a:off x="402336" y="3657600"/>
-            <a:ext cx="5486400" cy="3200400"/>
-          </a:xfrm>
-          <a:prstGeom prst="rect">
-            <a:avLst/>
-          </a:prstGeom>
-        </p:spPr>
-      </p:pic>
-      <p:pic>
-        <p:nvPicPr>
-          <p:cNvPr id="4" name="Picture 3" descr="modify_d1_d2_07.png"/>
-          <p:cNvPicPr>
-            <a:picLocks noChangeAspect="1"/>
-          </p:cNvPicPr>
-          <p:nvPr/>
-        </p:nvPicPr>
-        <p:blipFill>
-          <a:blip r:embed="rId4"/>
-          <a:stretch>
-            <a:fillRect/>
-          </a:stretch>
-        </p:blipFill>
-        <p:spPr>
-          <a:xfrm>
-            <a:off x="6300216" y="457200"/>
-            <a:ext cx="5486400" cy="3200400"/>
-          </a:xfrm>
-          <a:prstGeom prst="rect">
-            <a:avLst/>
-          </a:prstGeom>
-        </p:spPr>
-      </p:pic>
-      <p:pic>
-        <p:nvPicPr>
-          <p:cNvPr id="5" name="Picture 4" descr="modify_d1_d2_08.png"/>
-          <p:cNvPicPr>
-            <a:picLocks noChangeAspect="1"/>
-          </p:cNvPicPr>
-          <p:nvPr/>
-        </p:nvPicPr>
-        <p:blipFill>
-          <a:blip r:embed="rId5"/>
-          <a:stretch>
-            <a:fillRect/>
-          </a:stretch>
-        </p:blipFill>
-        <p:spPr>
-          <a:xfrm>
-            <a:off x="6300216" y="3657600"/>
-            <a:ext cx="5486400" cy="3200400"/>
-          </a:xfrm>
-          <a:prstGeom prst="rect">
-            <a:avLst/>
-          </a:prstGeom>
-        </p:spPr>
-      </p:pic>
-      <p:sp>
-        <p:nvSpPr>
-          <p:cNvPr id="6" name="TextBox 5"/>
-          <p:cNvSpPr txBox="1"/>
-          <p:nvPr/>
-        </p:nvSpPr>
-        <p:spPr>
-          <a:xfrm>
-            <a:off x="0" y="0"/>
-            <a:ext cx="12188952" cy="457200"/>
-          </a:xfrm>
-          <a:prstGeom prst="rect">
-            <a:avLst/>
-          </a:prstGeom>
-          <a:noFill/>
-        </p:spPr>
-        <p:txBody>
-          <a:bodyPr wrap="none">
-            <a:spAutoFit/>
-          </a:bodyPr>
-          <a:lstStyle/>
-          <a:p>
-            <a:pPr algn="ctr"/>
-            <a:r>
-              <a:rPr sz="2400" b="1"/>
-              <a:t>fit1p.mps</a:t>
-            </a:r>
-          </a:p>
-        </p:txBody>
-      </p:sp>
-    </p:spTree>
-  </p:cSld>
-  <p:clrMapOvr>
-    <a:masterClrMapping/>
-  </p:clrMapOvr>
-</p:sld>
-</file>
-
-<file path=ppt/slides/slide3.xml><?xml version="1.0" encoding="utf-8"?>
-<p:sld xmlns:a="http://schemas.openxmlformats.org/drawingml/2006/main" xmlns:p="http://schemas.openxmlformats.org/presentationml/2006/main" xmlns:r="http://schemas.openxmlformats.org/officeDocument/2006/relationships">
-  <p:cSld>
-    <p:spTree>
-      <p:nvGrpSpPr>
-        <p:cNvPr id="1" name=""/>
-        <p:cNvGrpSpPr/>
-        <p:nvPr/>
-      </p:nvGrpSpPr>
-      <p:grpSpPr/>
-      <p:pic>
-        <p:nvPicPr>
-          <p:cNvPr id="2" name="Picture 1" descr="modify_d1_d2_02.png"/>
-          <p:cNvPicPr>
-            <a:picLocks noChangeAspect="1"/>
-          </p:cNvPicPr>
-          <p:nvPr/>
-        </p:nvPicPr>
-        <p:blipFill>
-          <a:blip r:embed="rId2"/>
-          <a:stretch>
-            <a:fillRect/>
-          </a:stretch>
-        </p:blipFill>
-        <p:spPr>
-          <a:xfrm>
-            <a:off x="402336" y="457200"/>
-            <a:ext cx="5486400" cy="3200400"/>
-          </a:xfrm>
-          <a:prstGeom prst="rect">
-            <a:avLst/>
-          </a:prstGeom>
-        </p:spPr>
-      </p:pic>
-      <p:pic>
-        <p:nvPicPr>
-          <p:cNvPr id="3" name="Picture 2" descr="modify_d1_d2_01.png"/>
-          <p:cNvPicPr>
-            <a:picLocks noChangeAspect="1"/>
-          </p:cNvPicPr>
-          <p:nvPr/>
-        </p:nvPicPr>
-        <p:blipFill>
-          <a:blip r:embed="rId3"/>
-          <a:stretch>
-            <a:fillRect/>
-          </a:stretch>
-        </p:blipFill>
-        <p:spPr>
-          <a:xfrm>
-            <a:off x="402336" y="3657600"/>
-            <a:ext cx="5486400" cy="3200400"/>
-          </a:xfrm>
-          <a:prstGeom prst="rect">
-            <a:avLst/>
-          </a:prstGeom>
-        </p:spPr>
-      </p:pic>
-      <p:pic>
-        <p:nvPicPr>
-          <p:cNvPr id="4" name="Picture 3" descr="modify_d1_d2_10.png"/>
-          <p:cNvPicPr>
-            <a:picLocks noChangeAspect="1"/>
-          </p:cNvPicPr>
-          <p:nvPr/>
-        </p:nvPicPr>
-        <p:blipFill>
-          <a:blip r:embed="rId4"/>
-          <a:stretch>
-            <a:fillRect/>
-          </a:stretch>
-        </p:blipFill>
-        <p:spPr>
-          <a:xfrm>
-            <a:off x="6300216" y="457200"/>
-            <a:ext cx="5486400" cy="3200400"/>
-          </a:xfrm>
-          <a:prstGeom prst="rect">
-            <a:avLst/>
-          </a:prstGeom>
-        </p:spPr>
-      </p:pic>
-      <p:pic>
-        <p:nvPicPr>
-          <p:cNvPr id="5" name="Picture 4" descr="modify_d1_d2_09.png"/>
-          <p:cNvPicPr>
-            <a:picLocks noChangeAspect="1"/>
-          </p:cNvPicPr>
-          <p:nvPr/>
-        </p:nvPicPr>
-        <p:blipFill>
-          <a:blip r:embed="rId5"/>
-          <a:stretch>
-            <a:fillRect/>
-          </a:stretch>
-        </p:blipFill>
-        <p:spPr>
-          <a:xfrm>
-            <a:off x="6300216" y="3657600"/>
-            <a:ext cx="5486400" cy="3200400"/>
-          </a:xfrm>
-          <a:prstGeom prst="rect">
-            <a:avLst/>
-          </a:prstGeom>
-        </p:spPr>
-      </p:pic>
-      <p:sp>
-        <p:nvSpPr>
-          <p:cNvPr id="6" name="TextBox 5"/>
-          <p:cNvSpPr txBox="1"/>
-          <p:nvPr/>
-        </p:nvSpPr>
-        <p:spPr>
-          <a:xfrm>
-            <a:off x="0" y="0"/>
-            <a:ext cx="12188952" cy="457200"/>
-          </a:xfrm>
-          <a:prstGeom prst="rect">
-            <a:avLst/>
-          </a:prstGeom>
-          <a:noFill/>
-        </p:spPr>
-        <p:txBody>
-          <a:bodyPr wrap="none">
-            <a:spAutoFit/>
-          </a:bodyPr>
-          <a:lstStyle/>
-          <a:p>
-            <a:pPr algn="ctr"/>
-            <a:r>
-              <a:rPr sz="2400" b="1"/>
-              <a:t>fit1p.mps</a:t>
-            </a:r>
-          </a:p>
-        </p:txBody>
-      </p:sp>
-    </p:spTree>
-  </p:cSld>
-  <p:clrMapOvr>
-    <a:masterClrMapping/>
-  </p:clrMapOvr>
-</p:sld>
-</file>
-
-<file path=ppt/slides/slide4.xml><?xml version="1.0" encoding="utf-8"?>
-<p:sld xmlns:a="http://schemas.openxmlformats.org/drawingml/2006/main" xmlns:p="http://schemas.openxmlformats.org/presentationml/2006/main" xmlns:r="http://schemas.openxmlformats.org/officeDocument/2006/relationships">
-  <p:cSld>
-    <p:spTree>
-      <p:nvGrpSpPr>
-        <p:cNvPr id="1" name=""/>
-        <p:cNvGrpSpPr/>
-        <p:nvPr/>
-      </p:nvGrpSpPr>
-      <p:grpSpPr/>
-      <p:pic>
-        <p:nvPicPr>
-          <p:cNvPr id="2" name="Picture 1" descr="modify_d1_d2_03.png"/>
-          <p:cNvPicPr>
-            <a:picLocks noChangeAspect="1"/>
-          </p:cNvPicPr>
-          <p:nvPr/>
-        </p:nvPicPr>
-        <p:blipFill>
-          <a:blip r:embed="rId2"/>
-          <a:stretch>
-            <a:fillRect/>
-          </a:stretch>
-        </p:blipFill>
-        <p:spPr>
-          <a:xfrm>
-            <a:off x="402336" y="457200"/>
-            <a:ext cx="5486400" cy="3200400"/>
-          </a:xfrm>
-          <a:prstGeom prst="rect">
-            <a:avLst/>
-          </a:prstGeom>
-        </p:spPr>
-      </p:pic>
-      <p:pic>
-        <p:nvPicPr>
-          <p:cNvPr id="3" name="Picture 2" descr="modify_d1_d2_04.png"/>
-          <p:cNvPicPr>
-            <a:picLocks noChangeAspect="1"/>
-          </p:cNvPicPr>
-          <p:nvPr/>
-        </p:nvPicPr>
-        <p:blipFill>
-          <a:blip r:embed="rId3"/>
-          <a:stretch>
-            <a:fillRect/>
-          </a:stretch>
-        </p:blipFill>
-        <p:spPr>
-          <a:xfrm>
-            <a:off x="402336" y="3657600"/>
-            <a:ext cx="5486400" cy="3200400"/>
-          </a:xfrm>
-          <a:prstGeom prst="rect">
-            <a:avLst/>
-          </a:prstGeom>
-        </p:spPr>
-      </p:pic>
-      <p:pic>
-        <p:nvPicPr>
-          <p:cNvPr id="4" name="Picture 3" descr="modify_d1_d2_11.png"/>
-          <p:cNvPicPr>
-            <a:picLocks noChangeAspect="1"/>
-          </p:cNvPicPr>
-          <p:nvPr/>
-        </p:nvPicPr>
-        <p:blipFill>
-          <a:blip r:embed="rId4"/>
-          <a:stretch>
-            <a:fillRect/>
-          </a:stretch>
-        </p:blipFill>
-        <p:spPr>
-          <a:xfrm>
-            <a:off x="6300216" y="457200"/>
-            <a:ext cx="5486400" cy="3200400"/>
-          </a:xfrm>
-          <a:prstGeom prst="rect">
-            <a:avLst/>
-          </a:prstGeom>
-        </p:spPr>
-      </p:pic>
-      <p:pic>
-        <p:nvPicPr>
-          <p:cNvPr id="5" name="Picture 4" descr="modify_d1_d2_12.png"/>
-          <p:cNvPicPr>
-            <a:picLocks noChangeAspect="1"/>
-          </p:cNvPicPr>
-          <p:nvPr/>
-        </p:nvPicPr>
-        <p:blipFill>
-          <a:blip r:embed="rId5"/>
-          <a:stretch>
-            <a:fillRect/>
-          </a:stretch>
-        </p:blipFill>
-        <p:spPr>
-          <a:xfrm>
-            <a:off x="6300216" y="3657600"/>
-            <a:ext cx="5486400" cy="3200400"/>
-          </a:xfrm>
-          <a:prstGeom prst="rect">
-            <a:avLst/>
-          </a:prstGeom>
-        </p:spPr>
-      </p:pic>
-      <p:sp>
-        <p:nvSpPr>
-          <p:cNvPr id="6" name="TextBox 5"/>
-          <p:cNvSpPr txBox="1"/>
-          <p:nvPr/>
-        </p:nvSpPr>
-        <p:spPr>
-          <a:xfrm>
-            <a:off x="0" y="0"/>
-            <a:ext cx="12188952" cy="457200"/>
-          </a:xfrm>
-          <a:prstGeom prst="rect">
-            <a:avLst/>
-          </a:prstGeom>
-          <a:noFill/>
-        </p:spPr>
-        <p:txBody>
-          <a:bodyPr wrap="none">
-            <a:spAutoFit/>
-          </a:bodyPr>
-          <a:lstStyle/>
-          <a:p>
-            <a:pPr algn="ctr"/>
-            <a:r>
-              <a:rPr sz="2400" b="1"/>
-              <a:t>fit1p.mps</a:t>
-            </a:r>
-          </a:p>
-        </p:txBody>
-      </p:sp>
-    </p:spTree>
-  </p:cSld>
-  <p:clrMapOvr>
-    <a:masterClrMapping/>
-  </p:clrMapOvr>
-</p:sld>
-</file>
-
-<file path=ppt/slides/slide5.xml><?xml version="1.0" encoding="utf-8"?>
-<p:sld xmlns:a="http://schemas.openxmlformats.org/drawingml/2006/main" xmlns:p="http://schemas.openxmlformats.org/presentationml/2006/main" xmlns:r="http://schemas.openxmlformats.org/officeDocument/2006/relationships">
-  <p:cSld>
-    <p:spTree>
-      <p:nvGrpSpPr>
-        <p:cNvPr id="1" name=""/>
-        <p:cNvGrpSpPr/>
-        <p:nvPr/>
-      </p:nvGrpSpPr>
-      <p:grpSpPr/>
-      <p:pic>
-        <p:nvPicPr>
-          <p:cNvPr id="2" name="Picture 1" descr="modify_d1_d2_02.png"/>
-          <p:cNvPicPr>
-            <a:picLocks noChangeAspect="1"/>
-          </p:cNvPicPr>
-          <p:nvPr/>
-        </p:nvPicPr>
-        <p:blipFill>
-          <a:blip r:embed="rId2"/>
-          <a:stretch>
-            <a:fillRect/>
-          </a:stretch>
-        </p:blipFill>
-        <p:spPr>
-          <a:xfrm>
-            <a:off x="402336" y="457200"/>
-            <a:ext cx="5486400" cy="3200400"/>
-          </a:xfrm>
-          <a:prstGeom prst="rect">
-            <a:avLst/>
-          </a:prstGeom>
-        </p:spPr>
-      </p:pic>
-      <p:pic>
-        <p:nvPicPr>
-          <p:cNvPr id="3" name="Picture 2" descr="modify_d1_d2_01.png"/>
-          <p:cNvPicPr>
-            <a:picLocks noChangeAspect="1"/>
-          </p:cNvPicPr>
-          <p:nvPr/>
-        </p:nvPicPr>
-        <p:blipFill>
-          <a:blip r:embed="rId3"/>
-          <a:stretch>
-            <a:fillRect/>
-          </a:stretch>
-        </p:blipFill>
-        <p:spPr>
-          <a:xfrm>
-            <a:off x="402336" y="3657600"/>
-            <a:ext cx="5486400" cy="3200400"/>
-          </a:xfrm>
-          <a:prstGeom prst="rect">
-            <a:avLst/>
-          </a:prstGeom>
-        </p:spPr>
-      </p:pic>
-      <p:pic>
-        <p:nvPicPr>
-          <p:cNvPr id="4" name="Picture 3" descr="modify_d1_d2_14.png"/>
-          <p:cNvPicPr>
-            <a:picLocks noChangeAspect="1"/>
-          </p:cNvPicPr>
-          <p:nvPr/>
-        </p:nvPicPr>
-        <p:blipFill>
-          <a:blip r:embed="rId4"/>
-          <a:stretch>
-            <a:fillRect/>
-          </a:stretch>
-        </p:blipFill>
-        <p:spPr>
-          <a:xfrm>
-            <a:off x="6300216" y="457200"/>
-            <a:ext cx="5486400" cy="3200400"/>
-          </a:xfrm>
-          <a:prstGeom prst="rect">
-            <a:avLst/>
-          </a:prstGeom>
-        </p:spPr>
-      </p:pic>
-      <p:pic>
-        <p:nvPicPr>
-          <p:cNvPr id="5" name="Picture 4" descr="modify_d1_d2_13.png"/>
-          <p:cNvPicPr>
-            <a:picLocks noChangeAspect="1"/>
-          </p:cNvPicPr>
-          <p:nvPr/>
-        </p:nvPicPr>
-        <p:blipFill>
-          <a:blip r:embed="rId5"/>
-          <a:stretch>
-            <a:fillRect/>
-          </a:stretch>
-        </p:blipFill>
-        <p:spPr>
-          <a:xfrm>
-            <a:off x="6300216" y="3657600"/>
-            <a:ext cx="5486400" cy="3200400"/>
-          </a:xfrm>
-          <a:prstGeom prst="rect">
-            <a:avLst/>
-          </a:prstGeom>
-        </p:spPr>
-      </p:pic>
-      <p:sp>
-        <p:nvSpPr>
-          <p:cNvPr id="6" name="TextBox 5"/>
-          <p:cNvSpPr txBox="1"/>
-          <p:nvPr/>
-        </p:nvSpPr>
-        <p:spPr>
-          <a:xfrm>
-            <a:off x="0" y="0"/>
-            <a:ext cx="12188952" cy="457200"/>
-          </a:xfrm>
-          <a:prstGeom prst="rect">
-            <a:avLst/>
-          </a:prstGeom>
-          <a:noFill/>
-        </p:spPr>
-        <p:txBody>
-          <a:bodyPr wrap="none">
-            <a:spAutoFit/>
-          </a:bodyPr>
-          <a:lstStyle/>
-          <a:p>
-            <a:pPr algn="ctr"/>
-            <a:r>
-              <a:rPr sz="2400" b="1"/>
-              <a:t>fit1p.mps</a:t>
-            </a:r>
-          </a:p>
-        </p:txBody>
-      </p:sp>
-    </p:spTree>
-  </p:cSld>
-  <p:clrMapOvr>
-    <a:masterClrMapping/>
-  </p:clrMapOvr>
-</p:sld>
-</file>
-
-<file path=ppt/slides/slide6.xml><?xml version="1.0" encoding="utf-8"?>
-<p:sld xmlns:a="http://schemas.openxmlformats.org/drawingml/2006/main" xmlns:p="http://schemas.openxmlformats.org/presentationml/2006/main" xmlns:r="http://schemas.openxmlformats.org/officeDocument/2006/relationships">
-  <p:cSld>
-    <p:spTree>
-      <p:nvGrpSpPr>
-        <p:cNvPr id="1" name=""/>
-        <p:cNvGrpSpPr/>
-        <p:nvPr/>
-      </p:nvGrpSpPr>
-      <p:grpSpPr/>
-      <p:pic>
-        <p:nvPicPr>
-          <p:cNvPr id="2" name="Picture 1" descr="modify_d1_d2_03.png"/>
-          <p:cNvPicPr>
-            <a:picLocks noChangeAspect="1"/>
-          </p:cNvPicPr>
-          <p:nvPr/>
-        </p:nvPicPr>
-        <p:blipFill>
-          <a:blip r:embed="rId2"/>
-          <a:stretch>
-            <a:fillRect/>
-          </a:stretch>
-        </p:blipFill>
-        <p:spPr>
-          <a:xfrm>
-            <a:off x="402336" y="457200"/>
-            <a:ext cx="5486400" cy="3200400"/>
-          </a:xfrm>
-          <a:prstGeom prst="rect">
-            <a:avLst/>
-          </a:prstGeom>
-        </p:spPr>
-      </p:pic>
-      <p:pic>
-        <p:nvPicPr>
-          <p:cNvPr id="3" name="Picture 2" descr="modify_d1_d2_04.png"/>
-          <p:cNvPicPr>
-            <a:picLocks noChangeAspect="1"/>
-          </p:cNvPicPr>
-          <p:nvPr/>
-        </p:nvPicPr>
-        <p:blipFill>
-          <a:blip r:embed="rId3"/>
-          <a:stretch>
-            <a:fillRect/>
-          </a:stretch>
-        </p:blipFill>
-        <p:spPr>
-          <a:xfrm>
-            <a:off x="402336" y="3657600"/>
-            <a:ext cx="5486400" cy="3200400"/>
-          </a:xfrm>
-          <a:prstGeom prst="rect">
-            <a:avLst/>
-          </a:prstGeom>
-        </p:spPr>
-      </p:pic>
-      <p:pic>
-        <p:nvPicPr>
-          <p:cNvPr id="4" name="Picture 3" descr="modify_d1_d2_15.png"/>
-          <p:cNvPicPr>
-            <a:picLocks noChangeAspect="1"/>
-          </p:cNvPicPr>
-          <p:nvPr/>
-        </p:nvPicPr>
-        <p:blipFill>
-          <a:blip r:embed="rId4"/>
-          <a:stretch>
-            <a:fillRect/>
-          </a:stretch>
-        </p:blipFill>
-        <p:spPr>
-          <a:xfrm>
-            <a:off x="6300216" y="457200"/>
-            <a:ext cx="5486400" cy="3200400"/>
-          </a:xfrm>
-          <a:prstGeom prst="rect">
-            <a:avLst/>
-          </a:prstGeom>
-        </p:spPr>
-      </p:pic>
-      <p:pic>
-        <p:nvPicPr>
-          <p:cNvPr id="5" name="Picture 4" descr="modify_d1_d2_16.png"/>
-          <p:cNvPicPr>
-            <a:picLocks noChangeAspect="1"/>
-          </p:cNvPicPr>
-          <p:nvPr/>
-        </p:nvPicPr>
-        <p:blipFill>
-          <a:blip r:embed="rId5"/>
-          <a:stretch>
-            <a:fillRect/>
-          </a:stretch>
-        </p:blipFill>
-        <p:spPr>
-          <a:xfrm>
-            <a:off x="6300216" y="3657600"/>
-            <a:ext cx="5486400" cy="3200400"/>
-          </a:xfrm>
-          <a:prstGeom prst="rect">
-            <a:avLst/>
-          </a:prstGeom>
-        </p:spPr>
-      </p:pic>
-      <p:sp>
-        <p:nvSpPr>
-          <p:cNvPr id="6" name="TextBox 5"/>
-          <p:cNvSpPr txBox="1"/>
-          <p:nvPr/>
-        </p:nvSpPr>
-        <p:spPr>
-          <a:xfrm>
-            <a:off x="0" y="0"/>
-            <a:ext cx="12188952" cy="457200"/>
-          </a:xfrm>
-          <a:prstGeom prst="rect">
-            <a:avLst/>
-          </a:prstGeom>
-          <a:noFill/>
-        </p:spPr>
-        <p:txBody>
-          <a:bodyPr wrap="none">
-            <a:spAutoFit/>
-          </a:bodyPr>
-          <a:lstStyle/>
-          <a:p>
-            <a:pPr algn="ctr"/>
-            <a:r>
-              <a:rPr sz="2400" b="1"/>
-              <a:t>fit1p.mps</a:t>
-            </a:r>
-          </a:p>
-        </p:txBody>
-      </p:sp>
-    </p:spTree>
-  </p:cSld>
-  <p:clrMapOvr>
-    <a:masterClrMapping/>
-  </p:clrMapOvr>
-</p:sld>
-</file>
-
-<file path=ppt/slides/slide7.xml><?xml version="1.0" encoding="utf-8"?>
-<p:sld xmlns:a="http://schemas.openxmlformats.org/drawingml/2006/main" xmlns:p="http://schemas.openxmlformats.org/presentationml/2006/main" xmlns:r="http://schemas.openxmlformats.org/officeDocument/2006/relationships">
-  <p:cSld>
-    <p:spTree>
-      <p:nvGrpSpPr>
-        <p:cNvPr id="1" name=""/>
-        <p:cNvGrpSpPr/>
-        <p:nvPr/>
-      </p:nvGrpSpPr>
-      <p:grpSpPr/>
-      <p:pic>
-        <p:nvPicPr>
-          <p:cNvPr id="2" name="Picture 1" descr="modify_d1_d2_02.png"/>
-          <p:cNvPicPr>
-            <a:picLocks noChangeAspect="1"/>
-          </p:cNvPicPr>
-          <p:nvPr/>
-        </p:nvPicPr>
-        <p:blipFill>
-          <a:blip r:embed="rId2"/>
-          <a:stretch>
-            <a:fillRect/>
-          </a:stretch>
-        </p:blipFill>
-        <p:spPr>
-          <a:xfrm>
-            <a:off x="402336" y="457200"/>
-            <a:ext cx="5486400" cy="3200400"/>
-          </a:xfrm>
-          <a:prstGeom prst="rect">
-            <a:avLst/>
-          </a:prstGeom>
-        </p:spPr>
-      </p:pic>
-      <p:pic>
-        <p:nvPicPr>
-          <p:cNvPr id="3" name="Picture 2" descr="modify_d1_d2_01.png"/>
-          <p:cNvPicPr>
-            <a:picLocks noChangeAspect="1"/>
-          </p:cNvPicPr>
-          <p:nvPr/>
-        </p:nvPicPr>
-        <p:blipFill>
-          <a:blip r:embed="rId3"/>
-          <a:stretch>
-            <a:fillRect/>
-          </a:stretch>
-        </p:blipFill>
-        <p:spPr>
-          <a:xfrm>
-            <a:off x="402336" y="3657600"/>
-            <a:ext cx="5486400" cy="3200400"/>
-          </a:xfrm>
-          <a:prstGeom prst="rect">
-            <a:avLst/>
-          </a:prstGeom>
-        </p:spPr>
-      </p:pic>
-      <p:pic>
-        <p:nvPicPr>
-          <p:cNvPr id="4" name="Picture 3" descr="modify_d1_d2_18.png"/>
-          <p:cNvPicPr>
-            <a:picLocks noChangeAspect="1"/>
-          </p:cNvPicPr>
-          <p:nvPr/>
-        </p:nvPicPr>
-        <p:blipFill>
-          <a:blip r:embed="rId4"/>
-          <a:stretch>
-            <a:fillRect/>
-          </a:stretch>
-        </p:blipFill>
-        <p:spPr>
-          <a:xfrm>
-            <a:off x="6300216" y="457200"/>
-            <a:ext cx="5486400" cy="3200400"/>
-          </a:xfrm>
-          <a:prstGeom prst="rect">
-            <a:avLst/>
-          </a:prstGeom>
-        </p:spPr>
-      </p:pic>
-      <p:pic>
-        <p:nvPicPr>
-          <p:cNvPr id="5" name="Picture 4" descr="modify_d1_d2_17.png"/>
-          <p:cNvPicPr>
-            <a:picLocks noChangeAspect="1"/>
-          </p:cNvPicPr>
-          <p:nvPr/>
-        </p:nvPicPr>
-        <p:blipFill>
-          <a:blip r:embed="rId5"/>
-          <a:stretch>
-            <a:fillRect/>
-          </a:stretch>
-        </p:blipFill>
-        <p:spPr>
-          <a:xfrm>
-            <a:off x="6300216" y="3657600"/>
-            <a:ext cx="5486400" cy="3200400"/>
-          </a:xfrm>
-          <a:prstGeom prst="rect">
-            <a:avLst/>
-          </a:prstGeom>
-        </p:spPr>
-      </p:pic>
-      <p:sp>
-        <p:nvSpPr>
-          <p:cNvPr id="6" name="TextBox 5"/>
-          <p:cNvSpPr txBox="1"/>
-          <p:nvPr/>
-        </p:nvSpPr>
-        <p:spPr>
-          <a:xfrm>
-            <a:off x="0" y="0"/>
-            <a:ext cx="12188952" cy="457200"/>
-          </a:xfrm>
-          <a:prstGeom prst="rect">
-            <a:avLst/>
-          </a:prstGeom>
-          <a:noFill/>
-        </p:spPr>
-        <p:txBody>
-          <a:bodyPr wrap="none">
-            <a:spAutoFit/>
-          </a:bodyPr>
-          <a:lstStyle/>
-          <a:p>
-            <a:pPr algn="ctr"/>
-            <a:r>
-              <a:rPr sz="2400" b="1"/>
-              <a:t>fit1p.mps</a:t>
-            </a:r>
-          </a:p>
-        </p:txBody>
-      </p:sp>
-    </p:spTree>
-  </p:cSld>
-  <p:clrMapOvr>
-    <a:masterClrMapping/>
-  </p:clrMapOvr>
-</p:sld>
-</file>
-
-<file path=ppt/slides/slide8.xml><?xml version="1.0" encoding="utf-8"?>
-<p:sld xmlns:a="http://schemas.openxmlformats.org/drawingml/2006/main" xmlns:p="http://schemas.openxmlformats.org/presentationml/2006/main" xmlns:r="http://schemas.openxmlformats.org/officeDocument/2006/relationships">
-  <p:cSld>
-    <p:spTree>
-      <p:nvGrpSpPr>
-        <p:cNvPr id="1" name=""/>
-        <p:cNvGrpSpPr/>
-        <p:nvPr/>
-      </p:nvGrpSpPr>
-      <p:grpSpPr/>
-      <p:pic>
-        <p:nvPicPr>
-          <p:cNvPr id="2" name="Picture 1" descr="modify_d1_d2_03.png"/>
-          <p:cNvPicPr>
-            <a:picLocks noChangeAspect="1"/>
-          </p:cNvPicPr>
-          <p:nvPr/>
-        </p:nvPicPr>
-        <p:blipFill>
-          <a:blip r:embed="rId2"/>
-          <a:stretch>
-            <a:fillRect/>
-          </a:stretch>
-        </p:blipFill>
-        <p:spPr>
-          <a:xfrm>
-            <a:off x="402336" y="457200"/>
-            <a:ext cx="5486400" cy="3200400"/>
-          </a:xfrm>
-          <a:prstGeom prst="rect">
-            <a:avLst/>
-          </a:prstGeom>
-        </p:spPr>
-      </p:pic>
-      <p:pic>
-        <p:nvPicPr>
-          <p:cNvPr id="3" name="Picture 2" descr="modify_d1_d2_04.png"/>
-          <p:cNvPicPr>
-            <a:picLocks noChangeAspect="1"/>
-          </p:cNvPicPr>
-          <p:nvPr/>
-        </p:nvPicPr>
-        <p:blipFill>
-          <a:blip r:embed="rId3"/>
-          <a:stretch>
-            <a:fillRect/>
-          </a:stretch>
-        </p:blipFill>
-        <p:spPr>
-          <a:xfrm>
-            <a:off x="402336" y="3657600"/>
-            <a:ext cx="5486400" cy="3200400"/>
-          </a:xfrm>
-          <a:prstGeom prst="rect">
-            <a:avLst/>
-          </a:prstGeom>
-        </p:spPr>
-      </p:pic>
-      <p:pic>
-        <p:nvPicPr>
-          <p:cNvPr id="4" name="Picture 3" descr="modify_d1_d2_19.png"/>
-          <p:cNvPicPr>
-            <a:picLocks noChangeAspect="1"/>
-          </p:cNvPicPr>
-          <p:nvPr/>
-        </p:nvPicPr>
-        <p:blipFill>
-          <a:blip r:embed="rId4"/>
-          <a:stretch>
-            <a:fillRect/>
-          </a:stretch>
-        </p:blipFill>
-        <p:spPr>
-          <a:xfrm>
-            <a:off x="6300216" y="457200"/>
-            <a:ext cx="5486400" cy="3200400"/>
-          </a:xfrm>
-          <a:prstGeom prst="rect">
-            <a:avLst/>
-          </a:prstGeom>
-        </p:spPr>
-      </p:pic>
-      <p:pic>
-        <p:nvPicPr>
-          <p:cNvPr id="5" name="Picture 4" descr="modify_d1_d2_20.png"/>
-          <p:cNvPicPr>
-            <a:picLocks noChangeAspect="1"/>
-          </p:cNvPicPr>
-          <p:nvPr/>
-        </p:nvPicPr>
-        <p:blipFill>
-          <a:blip r:embed="rId5"/>
-          <a:stretch>
-            <a:fillRect/>
-          </a:stretch>
-        </p:blipFill>
-        <p:spPr>
-          <a:xfrm>
-            <a:off x="6300216" y="3657600"/>
-            <a:ext cx="5486400" cy="3200400"/>
-          </a:xfrm>
-          <a:prstGeom prst="rect">
-            <a:avLst/>
-          </a:prstGeom>
-        </p:spPr>
-      </p:pic>
-      <p:sp>
-        <p:nvSpPr>
-          <p:cNvPr id="6" name="TextBox 5"/>
-          <p:cNvSpPr txBox="1"/>
-          <p:nvPr/>
-        </p:nvSpPr>
-        <p:spPr>
-          <a:xfrm>
-            <a:off x="0" y="0"/>
-            <a:ext cx="12188952" cy="457200"/>
-          </a:xfrm>
-          <a:prstGeom prst="rect">
-            <a:avLst/>
-          </a:prstGeom>
-          <a:noFill/>
-        </p:spPr>
-        <p:txBody>
-          <a:bodyPr wrap="none">
-            <a:spAutoFit/>
-          </a:bodyPr>
-          <a:lstStyle/>
-          <a:p>
-            <a:pPr algn="ctr"/>
-            <a:r>
-              <a:rPr sz="2400" b="1"/>
-              <a:t>fit1p.mps</a:t>
-            </a:r>
-          </a:p>
-        </p:txBody>
-      </p:sp>
-    </p:spTree>
-  </p:cSld>
-  <p:clrMapOvr>
-    <a:masterClrMapping/>
-  </p:clrMapOvr>
-</p:sld>
-</file>
-
-<file path=ppt/slides/slide9.xml><?xml version="1.0" encoding="utf-8"?>
-<p:sld xmlns:a="http://schemas.openxmlformats.org/drawingml/2006/main" xmlns:p="http://schemas.openxmlformats.org/presentationml/2006/main" xmlns:r="http://schemas.openxmlformats.org/officeDocument/2006/relationships">
-  <p:cSld>
-    <p:spTree>
-      <p:nvGrpSpPr>
-        <p:cNvPr id="1" name=""/>
-        <p:cNvGrpSpPr/>
-        <p:nvPr/>
-      </p:nvGrpSpPr>
-      <p:grpSpPr/>
-      <p:pic>
-        <p:nvPicPr>
-          <p:cNvPr id="2" name="Picture 1" descr="modify_d1_d2_02.png"/>
-          <p:cNvPicPr>
-            <a:picLocks noChangeAspect="1"/>
-          </p:cNvPicPr>
-          <p:nvPr/>
-        </p:nvPicPr>
-        <p:blipFill>
-          <a:blip r:embed="rId2"/>
-          <a:stretch>
-            <a:fillRect/>
-          </a:stretch>
-        </p:blipFill>
-        <p:spPr>
-          <a:xfrm>
-            <a:off x="402336" y="457200"/>
-            <a:ext cx="5486400" cy="3200400"/>
-          </a:xfrm>
-          <a:prstGeom prst="rect">
-            <a:avLst/>
-          </a:prstGeom>
-        </p:spPr>
-      </p:pic>
-      <p:pic>
-        <p:nvPicPr>
-          <p:cNvPr id="3" name="Picture 2" descr="modify_d1_d2_01.png"/>
-          <p:cNvPicPr>
-            <a:picLocks noChangeAspect="1"/>
-          </p:cNvPicPr>
-          <p:nvPr/>
-        </p:nvPicPr>
-        <p:blipFill>
-          <a:blip r:embed="rId3"/>
-          <a:stretch>
-            <a:fillRect/>
-          </a:stretch>
-        </p:blipFill>
-        <p:spPr>
-          <a:xfrm>
-            <a:off x="402336" y="3657600"/>
-            <a:ext cx="5486400" cy="3200400"/>
-          </a:xfrm>
-          <a:prstGeom prst="rect">
-            <a:avLst/>
-          </a:prstGeom>
-        </p:spPr>
-      </p:pic>
-      <p:pic>
-        <p:nvPicPr>
-          <p:cNvPr id="4" name="Picture 3" descr="modify_d1_d2_22.png"/>
-          <p:cNvPicPr>
-            <a:picLocks noChangeAspect="1"/>
-          </p:cNvPicPr>
-          <p:nvPr/>
-        </p:nvPicPr>
-        <p:blipFill>
-          <a:blip r:embed="rId4"/>
-          <a:stretch>
-            <a:fillRect/>
-          </a:stretch>
-        </p:blipFill>
-        <p:spPr>
-          <a:xfrm>
-            <a:off x="6300216" y="457200"/>
-            <a:ext cx="5486400" cy="3200400"/>
-          </a:xfrm>
-          <a:prstGeom prst="rect">
-            <a:avLst/>
-          </a:prstGeom>
-        </p:spPr>
-      </p:pic>
-      <p:pic>
-        <p:nvPicPr>
-          <p:cNvPr id="5" name="Picture 4" descr="modify_d1_d2_21.png"/>
           <p:cNvPicPr>
             <a:picLocks noChangeAspect="1"/>
           </p:cNvPicPr>

</xml_diff>